<commit_message>
block script in chat
</commit_message>
<xml_diff>
--- a/fargate-redis-chat.pptx
+++ b/fargate-redis-chat.pptx
@@ -3,10 +3,11 @@
 <p:presentation xmlns:a="http://schemas.openxmlformats.org/drawingml/2006/main" xmlns:r="http://schemas.openxmlformats.org/officeDocument/2006/relationships" xmlns:p="http://schemas.openxmlformats.org/presentationml/2006/main" saveSubsetFonts="1" autoCompressPictures="0">
   <p:sldMasterIdLst>
     <p:sldMasterId id="2147483648" r:id="rId1"/>
+    <p:sldMasterId id="2147483660" r:id="rId2"/>
   </p:sldMasterIdLst>
   <p:sldIdLst>
-    <p:sldId id="256" r:id="rId2"/>
-    <p:sldId id="257" r:id="rId3"/>
+    <p:sldId id="256" r:id="rId3"/>
+    <p:sldId id="258" r:id="rId4"/>
   </p:sldIdLst>
   <p:sldSz cx="12192000" cy="6858000"/>
   <p:notesSz cx="6858000" cy="9144000"/>
@@ -260,7 +261,7 @@
           <a:p>
             <a:fld id="{C62A087A-3AAA-9242-80D0-8BB3078F33BE}" type="datetimeFigureOut">
               <a:rPr lang="en-US" smtClean="0"/>
-              <a:t>6/7/19</a:t>
+              <a:t>6/9/19</a:t>
             </a:fld>
             <a:endParaRPr lang="en-US"/>
           </a:p>
@@ -458,7 +459,7 @@
           <a:p>
             <a:fld id="{C62A087A-3AAA-9242-80D0-8BB3078F33BE}" type="datetimeFigureOut">
               <a:rPr lang="en-US" smtClean="0"/>
-              <a:t>6/7/19</a:t>
+              <a:t>6/9/19</a:t>
             </a:fld>
             <a:endParaRPr lang="en-US"/>
           </a:p>
@@ -666,7 +667,7 @@
           <a:p>
             <a:fld id="{C62A087A-3AAA-9242-80D0-8BB3078F33BE}" type="datetimeFigureOut">
               <a:rPr lang="en-US" smtClean="0"/>
-              <a:t>6/7/19</a:t>
+              <a:t>6/9/19</a:t>
             </a:fld>
             <a:endParaRPr lang="en-US"/>
           </a:p>
@@ -736,6 +737,672 @@
   <p:clrMapOvr>
     <a:masterClrMapping/>
   </p:clrMapOvr>
+</p:sldLayout>
+</file>
+
+<file path=ppt/slideLayouts/slideLayout12.xml><?xml version="1.0" encoding="utf-8"?>
+<p:sldLayout xmlns:a="http://schemas.openxmlformats.org/drawingml/2006/main" xmlns:r="http://schemas.openxmlformats.org/officeDocument/2006/relationships" xmlns:p="http://schemas.openxmlformats.org/presentationml/2006/main" preserve="1" userDrawn="1">
+  <p:cSld name="Title Only">
+    <p:bg>
+      <p:bgPr>
+        <a:solidFill>
+          <a:schemeClr val="bg1">
+            <a:lumMod val="85000"/>
+            <a:lumOff val="15000"/>
+          </a:schemeClr>
+        </a:solidFill>
+        <a:effectLst/>
+      </p:bgPr>
+    </p:bg>
+    <p:spTree>
+      <p:nvGrpSpPr>
+        <p:cNvPr id="1" name=""/>
+        <p:cNvGrpSpPr/>
+        <p:nvPr/>
+      </p:nvGrpSpPr>
+      <p:grpSpPr>
+        <a:xfrm>
+          <a:off x="0" y="0"/>
+          <a:ext cx="0" cy="0"/>
+          <a:chOff x="0" y="0"/>
+          <a:chExt cx="0" cy="0"/>
+        </a:xfrm>
+      </p:grpSpPr>
+      <p:sp>
+        <p:nvSpPr>
+          <p:cNvPr id="3" name="Title Placeholder 2">
+            <a:extLst>
+              <a:ext uri="{FF2B5EF4-FFF2-40B4-BE49-F238E27FC236}">
+                <a16:creationId xmlns:a16="http://schemas.microsoft.com/office/drawing/2014/main" id="{21A5E516-95B6-6249-8AC9-A13CA6AB1E1C}"/>
+              </a:ext>
+            </a:extLst>
+          </p:cNvPr>
+          <p:cNvSpPr>
+            <a:spLocks noGrp="1"/>
+          </p:cNvSpPr>
+          <p:nvPr>
+            <p:ph type="title"/>
+          </p:nvPr>
+        </p:nvSpPr>
+        <p:spPr>
+          <a:xfrm>
+            <a:off x="838173" y="364966"/>
+            <a:ext cx="10515655" cy="1042930"/>
+          </a:xfrm>
+          <a:prstGeom prst="rect">
+            <a:avLst/>
+          </a:prstGeom>
+        </p:spPr>
+        <p:txBody>
+          <a:bodyPr vert="horz" lIns="91440" tIns="45720" rIns="91440" bIns="45720" rtlCol="0" anchor="ctr">
+            <a:normAutofit/>
+          </a:bodyPr>
+          <a:lstStyle/>
+          <a:p>
+            <a:r>
+              <a:rPr lang="en-US" dirty="0"/>
+              <a:t>Click to edit Master title style</a:t>
+            </a:r>
+          </a:p>
+        </p:txBody>
+      </p:sp>
+    </p:spTree>
+    <p:extLst>
+      <p:ext uri="{BB962C8B-B14F-4D97-AF65-F5344CB8AC3E}">
+        <p14:creationId xmlns:p14="http://schemas.microsoft.com/office/powerpoint/2010/main" val="4277155885"/>
+      </p:ext>
+    </p:extLst>
+  </p:cSld>
+  <p:clrMapOvr>
+    <a:masterClrMapping/>
+  </p:clrMapOvr>
+  <p:transition>
+    <p:fade/>
+  </p:transition>
+</p:sldLayout>
+</file>
+
+<file path=ppt/slideLayouts/slideLayout13.xml><?xml version="1.0" encoding="utf-8"?>
+<p:sldLayout xmlns:a="http://schemas.openxmlformats.org/drawingml/2006/main" xmlns:r="http://schemas.openxmlformats.org/officeDocument/2006/relationships" xmlns:p="http://schemas.openxmlformats.org/presentationml/2006/main" type="blank">
+  <p:cSld name="Blank">
+    <p:spTree>
+      <p:nvGrpSpPr>
+        <p:cNvPr id="1" name=""/>
+        <p:cNvGrpSpPr/>
+        <p:nvPr/>
+      </p:nvGrpSpPr>
+      <p:grpSpPr>
+        <a:xfrm>
+          <a:off x="0" y="0"/>
+          <a:ext cx="0" cy="0"/>
+          <a:chOff x="0" y="0"/>
+          <a:chExt cx="0" cy="0"/>
+        </a:xfrm>
+      </p:grpSpPr>
+    </p:spTree>
+    <p:extLst>
+      <p:ext uri="{BB962C8B-B14F-4D97-AF65-F5344CB8AC3E}">
+        <p14:creationId xmlns:p14="http://schemas.microsoft.com/office/powerpoint/2010/main" val="3756302253"/>
+      </p:ext>
+    </p:extLst>
+  </p:cSld>
+  <p:clrMapOvr>
+    <a:masterClrMapping/>
+  </p:clrMapOvr>
+</p:sldLayout>
+</file>
+
+<file path=ppt/slideLayouts/slideLayout14.xml><?xml version="1.0" encoding="utf-8"?>
+<p:sldLayout xmlns:a="http://schemas.openxmlformats.org/drawingml/2006/main" xmlns:r="http://schemas.openxmlformats.org/officeDocument/2006/relationships" xmlns:p="http://schemas.openxmlformats.org/presentationml/2006/main" showMasterSp="0" preserve="1" userDrawn="1">
+  <p:cSld name="thick top ribbon">
+    <p:bg>
+      <p:bgPr>
+        <a:solidFill>
+          <a:srgbClr val="262626"/>
+        </a:solidFill>
+        <a:effectLst/>
+      </p:bgPr>
+    </p:bg>
+    <p:spTree>
+      <p:nvGrpSpPr>
+        <p:cNvPr id="1" name=""/>
+        <p:cNvGrpSpPr/>
+        <p:nvPr/>
+      </p:nvGrpSpPr>
+      <p:grpSpPr>
+        <a:xfrm>
+          <a:off x="0" y="0"/>
+          <a:ext cx="0" cy="0"/>
+          <a:chOff x="0" y="0"/>
+          <a:chExt cx="0" cy="0"/>
+        </a:xfrm>
+      </p:grpSpPr>
+      <p:pic>
+        <p:nvPicPr>
+          <p:cNvPr id="2" name="Picture 1"/>
+          <p:cNvPicPr>
+            <a:picLocks noChangeAspect="1"/>
+          </p:cNvPicPr>
+          <p:nvPr userDrawn="1"/>
+        </p:nvPicPr>
+        <p:blipFill rotWithShape="1">
+          <a:blip r:embed="rId2">
+            <a:extLst>
+              <a:ext uri="{28A0092B-C50C-407E-A947-70E740481C1C}">
+                <a14:useLocalDpi xmlns:a14="http://schemas.microsoft.com/office/drawing/2010/main" val="0"/>
+              </a:ext>
+            </a:extLst>
+          </a:blip>
+          <a:srcRect l="11484" t="23712" r="43335" b="22901"/>
+          <a:stretch/>
+        </p:blipFill>
+        <p:spPr>
+          <a:xfrm>
+            <a:off x="1" y="2"/>
+            <a:ext cx="12192000" cy="3144674"/>
+          </a:xfrm>
+          <a:prstGeom prst="rect">
+            <a:avLst/>
+          </a:prstGeom>
+        </p:spPr>
+      </p:pic>
+    </p:spTree>
+    <p:extLst>
+      <p:ext uri="{BB962C8B-B14F-4D97-AF65-F5344CB8AC3E}">
+        <p14:creationId xmlns:p14="http://schemas.microsoft.com/office/powerpoint/2010/main" val="1921316578"/>
+      </p:ext>
+    </p:extLst>
+  </p:cSld>
+  <p:clrMapOvr>
+    <a:masterClrMapping/>
+  </p:clrMapOvr>
+  <p:transition>
+    <p:fade/>
+  </p:transition>
+</p:sldLayout>
+</file>
+
+<file path=ppt/slideLayouts/slideLayout15.xml><?xml version="1.0" encoding="utf-8"?>
+<p:sldLayout xmlns:a="http://schemas.openxmlformats.org/drawingml/2006/main" xmlns:r="http://schemas.openxmlformats.org/officeDocument/2006/relationships" xmlns:p="http://schemas.openxmlformats.org/presentationml/2006/main" userDrawn="1">
+  <p:cSld name="thin top ribbon">
+    <p:bg>
+      <p:bgPr>
+        <a:solidFill>
+          <a:schemeClr val="bg1">
+            <a:lumMod val="85000"/>
+            <a:lumOff val="15000"/>
+          </a:schemeClr>
+        </a:solidFill>
+        <a:effectLst/>
+      </p:bgPr>
+    </p:bg>
+    <p:spTree>
+      <p:nvGrpSpPr>
+        <p:cNvPr id="1" name=""/>
+        <p:cNvGrpSpPr/>
+        <p:nvPr/>
+      </p:nvGrpSpPr>
+      <p:grpSpPr>
+        <a:xfrm>
+          <a:off x="0" y="0"/>
+          <a:ext cx="0" cy="0"/>
+          <a:chOff x="0" y="0"/>
+          <a:chExt cx="0" cy="0"/>
+        </a:xfrm>
+      </p:grpSpPr>
+      <p:sp>
+        <p:nvSpPr>
+          <p:cNvPr id="2" name="Title 1"/>
+          <p:cNvSpPr>
+            <a:spLocks noGrp="1"/>
+          </p:cNvSpPr>
+          <p:nvPr>
+            <p:ph type="title"/>
+          </p:nvPr>
+        </p:nvSpPr>
+        <p:spPr>
+          <a:xfrm>
+            <a:off x="1352243" y="1121063"/>
+            <a:ext cx="9487914" cy="899665"/>
+          </a:xfrm>
+          <a:prstGeom prst="rect">
+            <a:avLst/>
+          </a:prstGeom>
+        </p:spPr>
+        <p:txBody>
+          <a:bodyPr/>
+          <a:lstStyle>
+            <a:lvl1pPr algn="ctr">
+              <a:defRPr sz="2469"/>
+            </a:lvl1pPr>
+          </a:lstStyle>
+          <a:p>
+            <a:r>
+              <a:rPr lang="en-US" dirty="0"/>
+              <a:t>Click to edit Master title style</a:t>
+            </a:r>
+          </a:p>
+        </p:txBody>
+      </p:sp>
+      <p:pic>
+        <p:nvPicPr>
+          <p:cNvPr id="4" name="Picture 3"/>
+          <p:cNvPicPr>
+            <a:picLocks noChangeAspect="1"/>
+          </p:cNvPicPr>
+          <p:nvPr userDrawn="1"/>
+        </p:nvPicPr>
+        <p:blipFill rotWithShape="1">
+          <a:blip r:embed="rId2">
+            <a:extLst>
+              <a:ext uri="{28A0092B-C50C-407E-A947-70E740481C1C}">
+                <a14:useLocalDpi xmlns:a14="http://schemas.microsoft.com/office/drawing/2010/main" val="0"/>
+              </a:ext>
+            </a:extLst>
+          </a:blip>
+          <a:srcRect l="11459" t="22272" r="43113" b="35374"/>
+          <a:stretch/>
+        </p:blipFill>
+        <p:spPr>
+          <a:xfrm>
+            <a:off x="-12700" y="2"/>
+            <a:ext cx="12204701" cy="951037"/>
+          </a:xfrm>
+          <a:prstGeom prst="rect">
+            <a:avLst/>
+          </a:prstGeom>
+        </p:spPr>
+      </p:pic>
+    </p:spTree>
+    <p:extLst>
+      <p:ext uri="{BB962C8B-B14F-4D97-AF65-F5344CB8AC3E}">
+        <p14:creationId xmlns:p14="http://schemas.microsoft.com/office/powerpoint/2010/main" val="1410915568"/>
+      </p:ext>
+    </p:extLst>
+  </p:cSld>
+  <p:clrMapOvr>
+    <a:masterClrMapping/>
+  </p:clrMapOvr>
+  <p:transition>
+    <p:fade/>
+  </p:transition>
+</p:sldLayout>
+</file>
+
+<file path=ppt/slideLayouts/slideLayout16.xml><?xml version="1.0" encoding="utf-8"?>
+<p:sldLayout xmlns:a="http://schemas.openxmlformats.org/drawingml/2006/main" xmlns:r="http://schemas.openxmlformats.org/officeDocument/2006/relationships" xmlns:p="http://schemas.openxmlformats.org/presentationml/2006/main" userDrawn="1">
+  <p:cSld name="product feature">
+    <p:spTree>
+      <p:nvGrpSpPr>
+        <p:cNvPr id="1" name=""/>
+        <p:cNvGrpSpPr/>
+        <p:nvPr/>
+      </p:nvGrpSpPr>
+      <p:grpSpPr>
+        <a:xfrm>
+          <a:off x="0" y="0"/>
+          <a:ext cx="0" cy="0"/>
+          <a:chOff x="0" y="0"/>
+          <a:chExt cx="0" cy="0"/>
+        </a:xfrm>
+      </p:grpSpPr>
+      <p:pic>
+        <p:nvPicPr>
+          <p:cNvPr id="5" name="Picture 4">
+            <a:extLst>
+              <a:ext uri="{FF2B5EF4-FFF2-40B4-BE49-F238E27FC236}">
+                <a16:creationId xmlns:a16="http://schemas.microsoft.com/office/drawing/2014/main" id="{5D3570C4-248E-2847-8B45-283ED8386FDF}"/>
+              </a:ext>
+            </a:extLst>
+          </p:cNvPr>
+          <p:cNvPicPr>
+            <a:picLocks noChangeAspect="1"/>
+          </p:cNvPicPr>
+          <p:nvPr userDrawn="1"/>
+        </p:nvPicPr>
+        <p:blipFill>
+          <a:blip r:embed="rId2">
+            <a:extLst>
+              <a:ext uri="{28A0092B-C50C-407E-A947-70E740481C1C}">
+                <a14:useLocalDpi xmlns:a14="http://schemas.microsoft.com/office/drawing/2010/main" val="0"/>
+              </a:ext>
+            </a:extLst>
+          </a:blip>
+          <a:stretch>
+            <a:fillRect/>
+          </a:stretch>
+        </p:blipFill>
+        <p:spPr>
+          <a:xfrm>
+            <a:off x="0" y="335"/>
+            <a:ext cx="4983318" cy="6846861"/>
+          </a:xfrm>
+          <a:prstGeom prst="rect">
+            <a:avLst/>
+          </a:prstGeom>
+        </p:spPr>
+      </p:pic>
+      <p:pic>
+        <p:nvPicPr>
+          <p:cNvPr id="6" name="Picture 5">
+            <a:extLst>
+              <a:ext uri="{FF2B5EF4-FFF2-40B4-BE49-F238E27FC236}">
+                <a16:creationId xmlns:a16="http://schemas.microsoft.com/office/drawing/2014/main" id="{B205064E-B212-6642-900F-A6399B481A18}"/>
+              </a:ext>
+            </a:extLst>
+          </p:cNvPr>
+          <p:cNvPicPr>
+            <a:picLocks noChangeAspect="1"/>
+          </p:cNvPicPr>
+          <p:nvPr userDrawn="1"/>
+        </p:nvPicPr>
+        <p:blipFill rotWithShape="1">
+          <a:blip r:embed="rId3" cstate="print">
+            <a:extLst>
+              <a:ext uri="{28A0092B-C50C-407E-A947-70E740481C1C}">
+                <a14:useLocalDpi xmlns:a14="http://schemas.microsoft.com/office/drawing/2010/main" val="0"/>
+              </a:ext>
+            </a:extLst>
+          </a:blip>
+          <a:srcRect l="25123" t="35857" r="22575" b="19499"/>
+          <a:stretch/>
+        </p:blipFill>
+        <p:spPr>
+          <a:xfrm>
+            <a:off x="0" y="0"/>
+            <a:ext cx="1110489" cy="6858335"/>
+          </a:xfrm>
+          <a:prstGeom prst="rect">
+            <a:avLst/>
+          </a:prstGeom>
+        </p:spPr>
+      </p:pic>
+    </p:spTree>
+    <p:extLst>
+      <p:ext uri="{BB962C8B-B14F-4D97-AF65-F5344CB8AC3E}">
+        <p14:creationId xmlns:p14="http://schemas.microsoft.com/office/powerpoint/2010/main" val="549470885"/>
+      </p:ext>
+    </p:extLst>
+  </p:cSld>
+  <p:clrMapOvr>
+    <a:masterClrMapping/>
+  </p:clrMapOvr>
+</p:sldLayout>
+</file>
+
+<file path=ppt/slideLayouts/slideLayout17.xml><?xml version="1.0" encoding="utf-8"?>
+<p:sldLayout xmlns:a="http://schemas.openxmlformats.org/drawingml/2006/main" xmlns:r="http://schemas.openxmlformats.org/officeDocument/2006/relationships" xmlns:p="http://schemas.openxmlformats.org/presentationml/2006/main" userDrawn="1">
+  <p:cSld name="5_contour b&amp;w">
+    <p:spTree>
+      <p:nvGrpSpPr>
+        <p:cNvPr id="1" name=""/>
+        <p:cNvGrpSpPr/>
+        <p:nvPr/>
+      </p:nvGrpSpPr>
+      <p:grpSpPr>
+        <a:xfrm>
+          <a:off x="0" y="0"/>
+          <a:ext cx="0" cy="0"/>
+          <a:chOff x="0" y="0"/>
+          <a:chExt cx="0" cy="0"/>
+        </a:xfrm>
+      </p:grpSpPr>
+      <p:pic>
+        <p:nvPicPr>
+          <p:cNvPr id="3" name="Picture 2"/>
+          <p:cNvPicPr>
+            <a:picLocks noChangeAspect="1"/>
+          </p:cNvPicPr>
+          <p:nvPr userDrawn="1"/>
+        </p:nvPicPr>
+        <p:blipFill rotWithShape="1">
+          <a:blip r:embed="rId2">
+            <a:alphaModFix amt="3000"/>
+            <a:extLst>
+              <a:ext uri="{28A0092B-C50C-407E-A947-70E740481C1C}">
+                <a14:useLocalDpi xmlns:a14="http://schemas.microsoft.com/office/drawing/2010/main" val="0"/>
+              </a:ext>
+            </a:extLst>
+          </a:blip>
+          <a:srcRect l="16875" t="21903" r="29219" b="15559"/>
+          <a:stretch/>
+        </p:blipFill>
+        <p:spPr>
+          <a:xfrm>
+            <a:off x="-22872" y="-26707"/>
+            <a:ext cx="12214871" cy="6884708"/>
+          </a:xfrm>
+          <a:prstGeom prst="rect">
+            <a:avLst/>
+          </a:prstGeom>
+        </p:spPr>
+      </p:pic>
+      <p:pic>
+        <p:nvPicPr>
+          <p:cNvPr id="5" name="Picture 4">
+            <a:extLst>
+              <a:ext uri="{FF2B5EF4-FFF2-40B4-BE49-F238E27FC236}">
+                <a16:creationId xmlns:a16="http://schemas.microsoft.com/office/drawing/2014/main" id="{D39AB8A9-6DCC-7A40-9A4F-DDB2511FF62B}"/>
+              </a:ext>
+            </a:extLst>
+          </p:cNvPr>
+          <p:cNvPicPr>
+            <a:picLocks noChangeAspect="1"/>
+          </p:cNvPicPr>
+          <p:nvPr userDrawn="1"/>
+        </p:nvPicPr>
+        <p:blipFill rotWithShape="1">
+          <a:blip r:embed="rId2">
+            <a:alphaModFix amt="14000"/>
+            <a:extLst>
+              <a:ext uri="{28A0092B-C50C-407E-A947-70E740481C1C}">
+                <a14:useLocalDpi xmlns:a14="http://schemas.microsoft.com/office/drawing/2010/main" val="0"/>
+              </a:ext>
+            </a:extLst>
+          </a:blip>
+          <a:srcRect l="16875" t="21903" r="29219" b="15559"/>
+          <a:stretch/>
+        </p:blipFill>
+        <p:spPr>
+          <a:xfrm>
+            <a:off x="-22872" y="0"/>
+            <a:ext cx="12214871" cy="6884708"/>
+          </a:xfrm>
+          <a:prstGeom prst="rect">
+            <a:avLst/>
+          </a:prstGeom>
+        </p:spPr>
+      </p:pic>
+      <p:sp>
+        <p:nvSpPr>
+          <p:cNvPr id="7" name="Title 3">
+            <a:extLst>
+              <a:ext uri="{FF2B5EF4-FFF2-40B4-BE49-F238E27FC236}">
+                <a16:creationId xmlns:a16="http://schemas.microsoft.com/office/drawing/2014/main" id="{1EB753A0-6E5B-6141-B3E9-0E3C144549B1}"/>
+              </a:ext>
+            </a:extLst>
+          </p:cNvPr>
+          <p:cNvSpPr>
+            <a:spLocks noGrp="1"/>
+          </p:cNvSpPr>
+          <p:nvPr>
+            <p:ph type="title"/>
+          </p:nvPr>
+        </p:nvSpPr>
+        <p:spPr>
+          <a:xfrm>
+            <a:off x="838730" y="601580"/>
+            <a:ext cx="10514542" cy="1089109"/>
+          </a:xfrm>
+          <a:prstGeom prst="rect">
+            <a:avLst/>
+          </a:prstGeom>
+        </p:spPr>
+        <p:txBody>
+          <a:bodyPr/>
+          <a:lstStyle>
+            <a:lvl1pPr algn="ctr">
+              <a:defRPr sz="1975"/>
+            </a:lvl1pPr>
+          </a:lstStyle>
+          <a:p>
+            <a:r>
+              <a:rPr lang="en-US"/>
+              <a:t>Click to edit Master title style</a:t>
+            </a:r>
+          </a:p>
+        </p:txBody>
+      </p:sp>
+    </p:spTree>
+    <p:extLst>
+      <p:ext uri="{BB962C8B-B14F-4D97-AF65-F5344CB8AC3E}">
+        <p14:creationId xmlns:p14="http://schemas.microsoft.com/office/powerpoint/2010/main" val="191568571"/>
+      </p:ext>
+    </p:extLst>
+  </p:cSld>
+  <p:clrMapOvr>
+    <a:masterClrMapping/>
+  </p:clrMapOvr>
+</p:sldLayout>
+</file>
+
+<file path=ppt/slideLayouts/slideLayout18.xml><?xml version="1.0" encoding="utf-8"?>
+<p:sldLayout xmlns:a="http://schemas.openxmlformats.org/drawingml/2006/main" xmlns:r="http://schemas.openxmlformats.org/officeDocument/2006/relationships" xmlns:p="http://schemas.openxmlformats.org/presentationml/2006/main" preserve="1" userDrawn="1">
+  <p:cSld name="Contour left">
+    <p:spTree>
+      <p:nvGrpSpPr>
+        <p:cNvPr id="1" name=""/>
+        <p:cNvGrpSpPr/>
+        <p:nvPr/>
+      </p:nvGrpSpPr>
+      <p:grpSpPr>
+        <a:xfrm>
+          <a:off x="0" y="0"/>
+          <a:ext cx="0" cy="0"/>
+          <a:chOff x="0" y="0"/>
+          <a:chExt cx="0" cy="0"/>
+        </a:xfrm>
+      </p:grpSpPr>
+      <p:pic>
+        <p:nvPicPr>
+          <p:cNvPr id="4" name="Picture 3">
+            <a:extLst>
+              <a:ext uri="{FF2B5EF4-FFF2-40B4-BE49-F238E27FC236}">
+                <a16:creationId xmlns:a16="http://schemas.microsoft.com/office/drawing/2014/main" id="{5C08D2DA-0BA8-F84F-9ADF-E18619268072}"/>
+              </a:ext>
+            </a:extLst>
+          </p:cNvPr>
+          <p:cNvPicPr>
+            <a:picLocks noChangeAspect="1"/>
+          </p:cNvPicPr>
+          <p:nvPr userDrawn="1"/>
+        </p:nvPicPr>
+        <p:blipFill>
+          <a:blip r:embed="rId2">
+            <a:alphaModFix amt="50000"/>
+            <a:extLst>
+              <a:ext uri="{28A0092B-C50C-407E-A947-70E740481C1C}">
+                <a14:useLocalDpi xmlns:a14="http://schemas.microsoft.com/office/drawing/2010/main" val="0"/>
+              </a:ext>
+            </a:extLst>
+          </a:blip>
+          <a:stretch>
+            <a:fillRect/>
+          </a:stretch>
+        </p:blipFill>
+        <p:spPr>
+          <a:xfrm>
+            <a:off x="0" y="-175384"/>
+            <a:ext cx="5119074" cy="7033384"/>
+          </a:xfrm>
+          <a:prstGeom prst="rect">
+            <a:avLst/>
+          </a:prstGeom>
+        </p:spPr>
+      </p:pic>
+    </p:spTree>
+    <p:extLst>
+      <p:ext uri="{BB962C8B-B14F-4D97-AF65-F5344CB8AC3E}">
+        <p14:creationId xmlns:p14="http://schemas.microsoft.com/office/powerpoint/2010/main" val="4027137817"/>
+      </p:ext>
+    </p:extLst>
+  </p:cSld>
+  <p:clrMapOvr>
+    <a:masterClrMapping/>
+  </p:clrMapOvr>
+  <p:transition>
+    <p:fade/>
+  </p:transition>
+</p:sldLayout>
+</file>
+
+<file path=ppt/slideLayouts/slideLayout19.xml><?xml version="1.0" encoding="utf-8"?>
+<p:sldLayout xmlns:a="http://schemas.openxmlformats.org/drawingml/2006/main" xmlns:r="http://schemas.openxmlformats.org/officeDocument/2006/relationships" xmlns:p="http://schemas.openxmlformats.org/presentationml/2006/main" preserve="1" userDrawn="1">
+  <p:cSld name="Contour both sides">
+    <p:spTree>
+      <p:nvGrpSpPr>
+        <p:cNvPr id="1" name=""/>
+        <p:cNvGrpSpPr/>
+        <p:nvPr/>
+      </p:nvGrpSpPr>
+      <p:grpSpPr>
+        <a:xfrm>
+          <a:off x="0" y="0"/>
+          <a:ext cx="0" cy="0"/>
+          <a:chOff x="0" y="0"/>
+          <a:chExt cx="0" cy="0"/>
+        </a:xfrm>
+      </p:grpSpPr>
+      <p:pic>
+        <p:nvPicPr>
+          <p:cNvPr id="4" name="Picture 3">
+            <a:extLst>
+              <a:ext uri="{FF2B5EF4-FFF2-40B4-BE49-F238E27FC236}">
+                <a16:creationId xmlns:a16="http://schemas.microsoft.com/office/drawing/2014/main" id="{464C4523-D692-3042-9E45-7EE4659DD078}"/>
+              </a:ext>
+            </a:extLst>
+          </p:cNvPr>
+          <p:cNvPicPr>
+            <a:picLocks noChangeAspect="1"/>
+          </p:cNvPicPr>
+          <p:nvPr userDrawn="1"/>
+        </p:nvPicPr>
+        <p:blipFill>
+          <a:blip r:embed="rId2">
+            <a:alphaModFix amt="50000"/>
+            <a:extLst>
+              <a:ext uri="{28A0092B-C50C-407E-A947-70E740481C1C}">
+                <a14:useLocalDpi xmlns:a14="http://schemas.microsoft.com/office/drawing/2010/main" val="0"/>
+              </a:ext>
+            </a:extLst>
+          </a:blip>
+          <a:stretch>
+            <a:fillRect/>
+          </a:stretch>
+        </p:blipFill>
+        <p:spPr>
+          <a:xfrm>
+            <a:off x="199" y="335"/>
+            <a:ext cx="12191801" cy="6857442"/>
+          </a:xfrm>
+          <a:prstGeom prst="rect">
+            <a:avLst/>
+          </a:prstGeom>
+        </p:spPr>
+      </p:pic>
+    </p:spTree>
+    <p:extLst>
+      <p:ext uri="{BB962C8B-B14F-4D97-AF65-F5344CB8AC3E}">
+        <p14:creationId xmlns:p14="http://schemas.microsoft.com/office/powerpoint/2010/main" val="2422837953"/>
+      </p:ext>
+    </p:extLst>
+  </p:cSld>
+  <p:clrMapOvr>
+    <a:masterClrMapping/>
+  </p:clrMapOvr>
+  <p:transition>
+    <p:fade/>
+  </p:transition>
 </p:sldLayout>
 </file>
 
@@ -864,7 +1531,7 @@
           <a:p>
             <a:fld id="{C62A087A-3AAA-9242-80D0-8BB3078F33BE}" type="datetimeFigureOut">
               <a:rPr lang="en-US" smtClean="0"/>
-              <a:t>6/7/19</a:t>
+              <a:t>6/9/19</a:t>
             </a:fld>
             <a:endParaRPr lang="en-US"/>
           </a:p>
@@ -928,6 +1595,402 @@
     <p:extLst>
       <p:ext uri="{BB962C8B-B14F-4D97-AF65-F5344CB8AC3E}">
         <p14:creationId xmlns:p14="http://schemas.microsoft.com/office/powerpoint/2010/main" val="919046528"/>
+      </p:ext>
+    </p:extLst>
+  </p:cSld>
+  <p:clrMapOvr>
+    <a:masterClrMapping/>
+  </p:clrMapOvr>
+</p:sldLayout>
+</file>
+
+<file path=ppt/slideLayouts/slideLayout20.xml><?xml version="1.0" encoding="utf-8"?>
+<p:sldLayout xmlns:a="http://schemas.openxmlformats.org/drawingml/2006/main" xmlns:r="http://schemas.openxmlformats.org/officeDocument/2006/relationships" xmlns:p="http://schemas.openxmlformats.org/presentationml/2006/main" preserve="1" userDrawn="1">
+  <p:cSld name="Contour bottom">
+    <p:spTree>
+      <p:nvGrpSpPr>
+        <p:cNvPr id="1" name=""/>
+        <p:cNvGrpSpPr/>
+        <p:nvPr/>
+      </p:nvGrpSpPr>
+      <p:grpSpPr>
+        <a:xfrm>
+          <a:off x="0" y="0"/>
+          <a:ext cx="0" cy="0"/>
+          <a:chOff x="0" y="0"/>
+          <a:chExt cx="0" cy="0"/>
+        </a:xfrm>
+      </p:grpSpPr>
+      <p:pic>
+        <p:nvPicPr>
+          <p:cNvPr id="4" name="Picture 3">
+            <a:extLst>
+              <a:ext uri="{FF2B5EF4-FFF2-40B4-BE49-F238E27FC236}">
+                <a16:creationId xmlns:a16="http://schemas.microsoft.com/office/drawing/2014/main" id="{91559C26-FE89-5A49-8EB5-104E01BFC09B}"/>
+              </a:ext>
+            </a:extLst>
+          </p:cNvPr>
+          <p:cNvPicPr>
+            <a:picLocks noChangeAspect="1"/>
+          </p:cNvPicPr>
+          <p:nvPr userDrawn="1"/>
+        </p:nvPicPr>
+        <p:blipFill rotWithShape="1">
+          <a:blip r:embed="rId2">
+            <a:alphaModFix amt="50000"/>
+            <a:extLst>
+              <a:ext uri="{28A0092B-C50C-407E-A947-70E740481C1C}">
+                <a14:useLocalDpi xmlns:a14="http://schemas.microsoft.com/office/drawing/2010/main" val="0"/>
+              </a:ext>
+            </a:extLst>
+          </a:blip>
+          <a:srcRect b="6084"/>
+          <a:stretch/>
+        </p:blipFill>
+        <p:spPr>
+          <a:xfrm>
+            <a:off x="-117908" y="-2967092"/>
+            <a:ext cx="12309908" cy="9825092"/>
+          </a:xfrm>
+          <a:prstGeom prst="rect">
+            <a:avLst/>
+          </a:prstGeom>
+        </p:spPr>
+      </p:pic>
+    </p:spTree>
+    <p:extLst>
+      <p:ext uri="{BB962C8B-B14F-4D97-AF65-F5344CB8AC3E}">
+        <p14:creationId xmlns:p14="http://schemas.microsoft.com/office/powerpoint/2010/main" val="1164065209"/>
+      </p:ext>
+    </p:extLst>
+  </p:cSld>
+  <p:clrMapOvr>
+    <a:masterClrMapping/>
+  </p:clrMapOvr>
+  <p:transition>
+    <p:fade/>
+  </p:transition>
+</p:sldLayout>
+</file>
+
+<file path=ppt/slideLayouts/slideLayout21.xml><?xml version="1.0" encoding="utf-8"?>
+<p:sldLayout xmlns:a="http://schemas.openxmlformats.org/drawingml/2006/main" xmlns:r="http://schemas.openxmlformats.org/officeDocument/2006/relationships" xmlns:p="http://schemas.openxmlformats.org/presentationml/2006/main" userDrawn="1">
+  <p:cSld name="Title_Only">
+    <p:spTree>
+      <p:nvGrpSpPr>
+        <p:cNvPr id="1" name=""/>
+        <p:cNvGrpSpPr/>
+        <p:nvPr/>
+      </p:nvGrpSpPr>
+      <p:grpSpPr>
+        <a:xfrm>
+          <a:off x="0" y="0"/>
+          <a:ext cx="0" cy="0"/>
+          <a:chOff x="0" y="0"/>
+          <a:chExt cx="0" cy="0"/>
+        </a:xfrm>
+      </p:grpSpPr>
+      <p:sp>
+        <p:nvSpPr>
+          <p:cNvPr id="2" name="Title 1"/>
+          <p:cNvSpPr>
+            <a:spLocks noGrp="1"/>
+          </p:cNvSpPr>
+          <p:nvPr>
+            <p:ph type="title"/>
+          </p:nvPr>
+        </p:nvSpPr>
+        <p:spPr/>
+        <p:txBody>
+          <a:bodyPr/>
+          <a:lstStyle/>
+          <a:p>
+            <a:r>
+              <a:rPr lang="en-US"/>
+              <a:t>Click to edit Master title style</a:t>
+            </a:r>
+            <a:endParaRPr lang="en-US" dirty="0"/>
+          </a:p>
+        </p:txBody>
+      </p:sp>
+    </p:spTree>
+    <p:extLst>
+      <p:ext uri="{BB962C8B-B14F-4D97-AF65-F5344CB8AC3E}">
+        <p14:creationId xmlns:p14="http://schemas.microsoft.com/office/powerpoint/2010/main" val="2025159991"/>
+      </p:ext>
+    </p:extLst>
+  </p:cSld>
+  <p:clrMapOvr>
+    <a:masterClrMapping/>
+  </p:clrMapOvr>
+  <p:transition>
+    <p:fade/>
+  </p:transition>
+</p:sldLayout>
+</file>
+
+<file path=ppt/slideLayouts/slideLayout22.xml><?xml version="1.0" encoding="utf-8"?>
+<p:sldLayout xmlns:a="http://schemas.openxmlformats.org/drawingml/2006/main" xmlns:r="http://schemas.openxmlformats.org/officeDocument/2006/relationships" xmlns:p="http://schemas.openxmlformats.org/presentationml/2006/main" showMasterSp="0" userDrawn="1">
+  <p:cSld name="title page">
+    <p:bg bwMode="black">
+      <p:bgPr>
+        <a:solidFill>
+          <a:schemeClr val="bg1">
+            <a:lumMod val="85000"/>
+            <a:lumOff val="15000"/>
+          </a:schemeClr>
+        </a:solidFill>
+        <a:effectLst/>
+      </p:bgPr>
+    </p:bg>
+    <p:spTree>
+      <p:nvGrpSpPr>
+        <p:cNvPr id="1" name=""/>
+        <p:cNvGrpSpPr/>
+        <p:nvPr/>
+      </p:nvGrpSpPr>
+      <p:grpSpPr>
+        <a:xfrm>
+          <a:off x="0" y="0"/>
+          <a:ext cx="0" cy="0"/>
+          <a:chOff x="0" y="0"/>
+          <a:chExt cx="0" cy="0"/>
+        </a:xfrm>
+      </p:grpSpPr>
+      <p:pic>
+        <p:nvPicPr>
+          <p:cNvPr id="3" name="Picture 2"/>
+          <p:cNvPicPr>
+            <a:picLocks noChangeAspect="1"/>
+          </p:cNvPicPr>
+          <p:nvPr userDrawn="1"/>
+        </p:nvPicPr>
+        <p:blipFill rotWithShape="1">
+          <a:blip r:embed="rId2">
+            <a:extLst>
+              <a:ext uri="{28A0092B-C50C-407E-A947-70E740481C1C}">
+                <a14:useLocalDpi xmlns:a14="http://schemas.microsoft.com/office/drawing/2010/main" val="0"/>
+              </a:ext>
+            </a:extLst>
+          </a:blip>
+          <a:srcRect l="17217" t="22350" r="29636" b="16145"/>
+          <a:stretch/>
+        </p:blipFill>
+        <p:spPr>
+          <a:xfrm>
+            <a:off x="-14377" y="1"/>
+            <a:ext cx="12206378" cy="6862803"/>
+          </a:xfrm>
+          <a:prstGeom prst="rect">
+            <a:avLst/>
+          </a:prstGeom>
+        </p:spPr>
+      </p:pic>
+    </p:spTree>
+    <p:extLst>
+      <p:ext uri="{BB962C8B-B14F-4D97-AF65-F5344CB8AC3E}">
+        <p14:creationId xmlns:p14="http://schemas.microsoft.com/office/powerpoint/2010/main" val="1973979249"/>
+      </p:ext>
+    </p:extLst>
+  </p:cSld>
+  <p:clrMapOvr>
+    <a:masterClrMapping/>
+  </p:clrMapOvr>
+  <p:transition>
+    <p:fade/>
+  </p:transition>
+</p:sldLayout>
+</file>
+
+<file path=ppt/slideLayouts/slideLayout23.xml><?xml version="1.0" encoding="utf-8"?>
+<p:sldLayout xmlns:a="http://schemas.openxmlformats.org/drawingml/2006/main" xmlns:r="http://schemas.openxmlformats.org/officeDocument/2006/relationships" xmlns:p="http://schemas.openxmlformats.org/presentationml/2006/main" type="obj">
+  <p:cSld name="Title and Content">
+    <p:spTree>
+      <p:nvGrpSpPr>
+        <p:cNvPr id="1" name=""/>
+        <p:cNvGrpSpPr/>
+        <p:nvPr/>
+      </p:nvGrpSpPr>
+      <p:grpSpPr>
+        <a:xfrm>
+          <a:off x="0" y="0"/>
+          <a:ext cx="0" cy="0"/>
+          <a:chOff x="0" y="0"/>
+          <a:chExt cx="0" cy="0"/>
+        </a:xfrm>
+      </p:grpSpPr>
+      <p:sp>
+        <p:nvSpPr>
+          <p:cNvPr id="2" name="Title 1">
+            <a:extLst>
+              <a:ext uri="{FF2B5EF4-FFF2-40B4-BE49-F238E27FC236}">
+                <a16:creationId xmlns:a16="http://schemas.microsoft.com/office/drawing/2014/main" id="{403C5A7B-859A-6B4E-B624-BA43A8E3D3B5}"/>
+              </a:ext>
+            </a:extLst>
+          </p:cNvPr>
+          <p:cNvSpPr>
+            <a:spLocks noGrp="1"/>
+          </p:cNvSpPr>
+          <p:nvPr>
+            <p:ph type="title"/>
+          </p:nvPr>
+        </p:nvSpPr>
+        <p:spPr/>
+        <p:txBody>
+          <a:bodyPr/>
+          <a:lstStyle/>
+          <a:p>
+            <a:r>
+              <a:rPr lang="en-US"/>
+              <a:t>Click to edit Master title style</a:t>
+            </a:r>
+          </a:p>
+        </p:txBody>
+      </p:sp>
+      <p:sp>
+        <p:nvSpPr>
+          <p:cNvPr id="3" name="Content Placeholder 2">
+            <a:extLst>
+              <a:ext uri="{FF2B5EF4-FFF2-40B4-BE49-F238E27FC236}">
+                <a16:creationId xmlns:a16="http://schemas.microsoft.com/office/drawing/2014/main" id="{3CEEF4C0-093D-4649-942C-97A2DC6C876B}"/>
+              </a:ext>
+            </a:extLst>
+          </p:cNvPr>
+          <p:cNvSpPr>
+            <a:spLocks noGrp="1"/>
+          </p:cNvSpPr>
+          <p:nvPr>
+            <p:ph idx="1"/>
+          </p:nvPr>
+        </p:nvSpPr>
+        <p:spPr/>
+        <p:txBody>
+          <a:bodyPr/>
+          <a:lstStyle/>
+          <a:p>
+            <a:pPr lvl="0"/>
+            <a:r>
+              <a:rPr lang="en-US"/>
+              <a:t>Edit Master text styles</a:t>
+            </a:r>
+          </a:p>
+          <a:p>
+            <a:pPr lvl="1"/>
+            <a:r>
+              <a:rPr lang="en-US"/>
+              <a:t>Second level</a:t>
+            </a:r>
+          </a:p>
+          <a:p>
+            <a:pPr lvl="2"/>
+            <a:r>
+              <a:rPr lang="en-US"/>
+              <a:t>Third level</a:t>
+            </a:r>
+          </a:p>
+          <a:p>
+            <a:pPr lvl="3"/>
+            <a:r>
+              <a:rPr lang="en-US"/>
+              <a:t>Fourth level</a:t>
+            </a:r>
+          </a:p>
+          <a:p>
+            <a:pPr lvl="4"/>
+            <a:r>
+              <a:rPr lang="en-US"/>
+              <a:t>Fifth level</a:t>
+            </a:r>
+          </a:p>
+        </p:txBody>
+      </p:sp>
+      <p:sp>
+        <p:nvSpPr>
+          <p:cNvPr id="4" name="Date Placeholder 3">
+            <a:extLst>
+              <a:ext uri="{FF2B5EF4-FFF2-40B4-BE49-F238E27FC236}">
+                <a16:creationId xmlns:a16="http://schemas.microsoft.com/office/drawing/2014/main" id="{596140C6-54BB-B647-9A01-5B87584102E3}"/>
+              </a:ext>
+            </a:extLst>
+          </p:cNvPr>
+          <p:cNvSpPr>
+            <a:spLocks noGrp="1"/>
+          </p:cNvSpPr>
+          <p:nvPr>
+            <p:ph type="dt" sz="half" idx="10"/>
+          </p:nvPr>
+        </p:nvSpPr>
+        <p:spPr/>
+        <p:txBody>
+          <a:bodyPr/>
+          <a:lstStyle/>
+          <a:p>
+            <a:fld id="{C62A087A-3AAA-9242-80D0-8BB3078F33BE}" type="datetimeFigureOut">
+              <a:rPr lang="en-US" smtClean="0"/>
+              <a:t>6/9/19</a:t>
+            </a:fld>
+            <a:endParaRPr lang="en-US"/>
+          </a:p>
+        </p:txBody>
+      </p:sp>
+      <p:sp>
+        <p:nvSpPr>
+          <p:cNvPr id="5" name="Footer Placeholder 4">
+            <a:extLst>
+              <a:ext uri="{FF2B5EF4-FFF2-40B4-BE49-F238E27FC236}">
+                <a16:creationId xmlns:a16="http://schemas.microsoft.com/office/drawing/2014/main" id="{FC01F908-ADB2-6742-B367-B7AB246DA8D6}"/>
+              </a:ext>
+            </a:extLst>
+          </p:cNvPr>
+          <p:cNvSpPr>
+            <a:spLocks noGrp="1"/>
+          </p:cNvSpPr>
+          <p:nvPr>
+            <p:ph type="ftr" sz="quarter" idx="11"/>
+          </p:nvPr>
+        </p:nvSpPr>
+        <p:spPr/>
+        <p:txBody>
+          <a:bodyPr/>
+          <a:lstStyle/>
+          <a:p>
+            <a:endParaRPr lang="en-US"/>
+          </a:p>
+        </p:txBody>
+      </p:sp>
+      <p:sp>
+        <p:nvSpPr>
+          <p:cNvPr id="6" name="Slide Number Placeholder 5">
+            <a:extLst>
+              <a:ext uri="{FF2B5EF4-FFF2-40B4-BE49-F238E27FC236}">
+                <a16:creationId xmlns:a16="http://schemas.microsoft.com/office/drawing/2014/main" id="{6F8C74DD-C6D4-1A41-9BF0-B5722790604F}"/>
+              </a:ext>
+            </a:extLst>
+          </p:cNvPr>
+          <p:cNvSpPr>
+            <a:spLocks noGrp="1"/>
+          </p:cNvSpPr>
+          <p:nvPr>
+            <p:ph type="sldNum" sz="quarter" idx="12"/>
+          </p:nvPr>
+        </p:nvSpPr>
+        <p:spPr/>
+        <p:txBody>
+          <a:bodyPr/>
+          <a:lstStyle/>
+          <a:p>
+            <a:fld id="{73F16480-E6DC-5D4A-8CA6-52DFC3C4CE53}" type="slidenum">
+              <a:rPr lang="en-US" smtClean="0"/>
+              <a:t>‹#›</a:t>
+            </a:fld>
+            <a:endParaRPr lang="en-US"/>
+          </a:p>
+        </p:txBody>
+      </p:sp>
+    </p:spTree>
+    <p:extLst>
+      <p:ext uri="{BB962C8B-B14F-4D97-AF65-F5344CB8AC3E}">
+        <p14:creationId xmlns:p14="http://schemas.microsoft.com/office/powerpoint/2010/main" val="2488396662"/>
       </p:ext>
     </p:extLst>
   </p:cSld>
@@ -1139,7 +2202,7 @@
           <a:p>
             <a:fld id="{C62A087A-3AAA-9242-80D0-8BB3078F33BE}" type="datetimeFigureOut">
               <a:rPr lang="en-US" smtClean="0"/>
-              <a:t>6/7/19</a:t>
+              <a:t>6/9/19</a:t>
             </a:fld>
             <a:endParaRPr lang="en-US"/>
           </a:p>
@@ -1404,7 +2467,7 @@
           <a:p>
             <a:fld id="{C62A087A-3AAA-9242-80D0-8BB3078F33BE}" type="datetimeFigureOut">
               <a:rPr lang="en-US" smtClean="0"/>
-              <a:t>6/7/19</a:t>
+              <a:t>6/9/19</a:t>
             </a:fld>
             <a:endParaRPr lang="en-US"/>
           </a:p>
@@ -1816,7 +2879,7 @@
           <a:p>
             <a:fld id="{C62A087A-3AAA-9242-80D0-8BB3078F33BE}" type="datetimeFigureOut">
               <a:rPr lang="en-US" smtClean="0"/>
-              <a:t>6/7/19</a:t>
+              <a:t>6/9/19</a:t>
             </a:fld>
             <a:endParaRPr lang="en-US"/>
           </a:p>
@@ -1957,7 +3020,7 @@
           <a:p>
             <a:fld id="{C62A087A-3AAA-9242-80D0-8BB3078F33BE}" type="datetimeFigureOut">
               <a:rPr lang="en-US" smtClean="0"/>
-              <a:t>6/7/19</a:t>
+              <a:t>6/9/19</a:t>
             </a:fld>
             <a:endParaRPr lang="en-US"/>
           </a:p>
@@ -2070,7 +3133,7 @@
           <a:p>
             <a:fld id="{C62A087A-3AAA-9242-80D0-8BB3078F33BE}" type="datetimeFigureOut">
               <a:rPr lang="en-US" smtClean="0"/>
-              <a:t>6/7/19</a:t>
+              <a:t>6/9/19</a:t>
             </a:fld>
             <a:endParaRPr lang="en-US"/>
           </a:p>
@@ -2381,7 +3444,7 @@
           <a:p>
             <a:fld id="{C62A087A-3AAA-9242-80D0-8BB3078F33BE}" type="datetimeFigureOut">
               <a:rPr lang="en-US" smtClean="0"/>
-              <a:t>6/7/19</a:t>
+              <a:t>6/9/19</a:t>
             </a:fld>
             <a:endParaRPr lang="en-US"/>
           </a:p>
@@ -2669,7 +3732,7 @@
           <a:p>
             <a:fld id="{C62A087A-3AAA-9242-80D0-8BB3078F33BE}" type="datetimeFigureOut">
               <a:rPr lang="en-US" smtClean="0"/>
-              <a:t>6/7/19</a:t>
+              <a:t>6/9/19</a:t>
             </a:fld>
             <a:endParaRPr lang="en-US"/>
           </a:p>
@@ -2910,7 +3973,7 @@
           <a:p>
             <a:fld id="{C62A087A-3AAA-9242-80D0-8BB3078F33BE}" type="datetimeFigureOut">
               <a:rPr lang="en-US" smtClean="0"/>
-              <a:t>6/7/19</a:t>
+              <a:t>6/9/19</a:t>
             </a:fld>
             <a:endParaRPr lang="en-US"/>
           </a:p>
@@ -3310,6 +4373,539 @@
 </p:sldMaster>
 </file>
 
+<file path=ppt/slideMasters/slideMaster2.xml><?xml version="1.0" encoding="utf-8"?>
+<p:sldMaster xmlns:a="http://schemas.openxmlformats.org/drawingml/2006/main" xmlns:r="http://schemas.openxmlformats.org/officeDocument/2006/relationships" xmlns:p="http://schemas.openxmlformats.org/presentationml/2006/main" preserve="1">
+  <p:cSld>
+    <p:bg bwMode="auto">
+      <p:bgPr>
+        <a:solidFill>
+          <a:schemeClr val="bg1">
+            <a:lumMod val="85000"/>
+            <a:lumOff val="15000"/>
+          </a:schemeClr>
+        </a:solidFill>
+        <a:effectLst/>
+      </p:bgPr>
+    </p:bg>
+    <p:spTree>
+      <p:nvGrpSpPr>
+        <p:cNvPr id="1" name=""/>
+        <p:cNvGrpSpPr/>
+        <p:nvPr/>
+      </p:nvGrpSpPr>
+      <p:grpSpPr>
+        <a:xfrm>
+          <a:off x="0" y="0"/>
+          <a:ext cx="0" cy="0"/>
+          <a:chOff x="0" y="0"/>
+          <a:chExt cx="0" cy="0"/>
+        </a:xfrm>
+      </p:grpSpPr>
+      <p:sp>
+        <p:nvSpPr>
+          <p:cNvPr id="3" name="Title Placeholder 2">
+            <a:extLst>
+              <a:ext uri="{FF2B5EF4-FFF2-40B4-BE49-F238E27FC236}">
+                <a16:creationId xmlns:a16="http://schemas.microsoft.com/office/drawing/2014/main" id="{0CCA29B7-6AC1-8043-B793-5C530994737A}"/>
+              </a:ext>
+            </a:extLst>
+          </p:cNvPr>
+          <p:cNvSpPr>
+            <a:spLocks noGrp="1"/>
+          </p:cNvSpPr>
+          <p:nvPr>
+            <p:ph type="title"/>
+          </p:nvPr>
+        </p:nvSpPr>
+        <p:spPr>
+          <a:xfrm>
+            <a:off x="838173" y="364966"/>
+            <a:ext cx="10515655" cy="1042930"/>
+          </a:xfrm>
+          <a:prstGeom prst="rect">
+            <a:avLst/>
+          </a:prstGeom>
+        </p:spPr>
+        <p:txBody>
+          <a:bodyPr vert="horz" lIns="91440" tIns="45720" rIns="91440" bIns="45720" rtlCol="0" anchor="ctr">
+            <a:normAutofit/>
+          </a:bodyPr>
+          <a:lstStyle/>
+          <a:p>
+            <a:r>
+              <a:rPr lang="en-US" dirty="0"/>
+              <a:t>Click to edit Master title style</a:t>
+            </a:r>
+          </a:p>
+        </p:txBody>
+      </p:sp>
+    </p:spTree>
+    <p:extLst>
+      <p:ext uri="{BB962C8B-B14F-4D97-AF65-F5344CB8AC3E}">
+        <p14:creationId xmlns:p14="http://schemas.microsoft.com/office/powerpoint/2010/main" val="129009050"/>
+      </p:ext>
+    </p:extLst>
+  </p:cSld>
+  <p:clrMap bg1="dk1" tx1="lt1" bg2="dk2" tx2="lt2" accent1="accent1" accent2="accent2" accent3="accent3" accent4="accent4" accent5="accent5" accent6="accent6" hlink="hlink" folHlink="folHlink"/>
+  <p:sldLayoutIdLst>
+    <p:sldLayoutId id="2147483661" r:id="rId1"/>
+    <p:sldLayoutId id="2147483662" r:id="rId2"/>
+    <p:sldLayoutId id="2147483663" r:id="rId3"/>
+    <p:sldLayoutId id="2147483664" r:id="rId4"/>
+    <p:sldLayoutId id="2147483665" r:id="rId5"/>
+    <p:sldLayoutId id="2147483666" r:id="rId6"/>
+    <p:sldLayoutId id="2147483667" r:id="rId7"/>
+    <p:sldLayoutId id="2147483668" r:id="rId8"/>
+    <p:sldLayoutId id="2147483669" r:id="rId9"/>
+    <p:sldLayoutId id="2147483670" r:id="rId10"/>
+    <p:sldLayoutId id="2147483671" r:id="rId11"/>
+    <p:sldLayoutId id="2147483672" r:id="rId12"/>
+  </p:sldLayoutIdLst>
+  <p:transition>
+    <p:fade/>
+  </p:transition>
+  <p:hf sldNum="0" hdr="0" ftr="0" dt="0"/>
+  <p:txStyles>
+    <p:titleStyle>
+      <a:lvl1pPr algn="ctr" defTabSz="541870" rtl="0" eaLnBrk="1" latinLnBrk="0" hangingPunct="1">
+        <a:lnSpc>
+          <a:spcPct val="90000"/>
+        </a:lnSpc>
+        <a:spcBef>
+          <a:spcPct val="0"/>
+        </a:spcBef>
+        <a:buNone/>
+        <a:defRPr lang="en-US" sz="2400" b="0" kern="1200" cap="none" spc="25" baseline="0" dirty="0" smtClean="0">
+          <a:ln w="3175">
+            <a:noFill/>
+          </a:ln>
+          <a:solidFill>
+            <a:schemeClr val="tx1"/>
+          </a:solidFill>
+          <a:effectLst/>
+          <a:latin typeface="+mj-lt"/>
+          <a:ea typeface="Amazon Ember Light" panose="020B0403020204020204" pitchFamily="34" charset="0"/>
+          <a:cs typeface="Amazon Ember Light" panose="020B0403020204020204" pitchFamily="34" charset="0"/>
+        </a:defRPr>
+      </a:lvl1pPr>
+    </p:titleStyle>
+    <p:bodyStyle>
+      <a:lvl1pPr marL="0" marR="0" indent="0" algn="l" defTabSz="541870" rtl="0" eaLnBrk="1" fontAlgn="auto" latinLnBrk="0" hangingPunct="1">
+        <a:lnSpc>
+          <a:spcPct val="90000"/>
+        </a:lnSpc>
+        <a:spcBef>
+          <a:spcPct val="20000"/>
+        </a:spcBef>
+        <a:spcAft>
+          <a:spcPts val="0"/>
+        </a:spcAft>
+        <a:buClrTx/>
+        <a:buSzPct val="90000"/>
+        <a:buFont typeface="Arial" pitchFamily="34" charset="0"/>
+        <a:buNone/>
+        <a:tabLst/>
+        <a:defRPr sz="1650" b="0" kern="1200" spc="0" baseline="0">
+          <a:solidFill>
+            <a:schemeClr val="tx1"/>
+          </a:solidFill>
+          <a:latin typeface="Amazon Ember" panose="020B0603020204020204" pitchFamily="34" charset="0"/>
+          <a:ea typeface="Amazon Ember" panose="020B0603020204020204" pitchFamily="34" charset="0"/>
+          <a:cs typeface="Amazon Ember" panose="020B0603020204020204" pitchFamily="34" charset="0"/>
+        </a:defRPr>
+      </a:lvl1pPr>
+      <a:lvl2pPr marL="199205" marR="0" indent="0" algn="l" defTabSz="541870" rtl="0" eaLnBrk="1" fontAlgn="auto" latinLnBrk="0" hangingPunct="1">
+        <a:lnSpc>
+          <a:spcPct val="90000"/>
+        </a:lnSpc>
+        <a:spcBef>
+          <a:spcPts val="296"/>
+        </a:spcBef>
+        <a:spcAft>
+          <a:spcPts val="0"/>
+        </a:spcAft>
+        <a:buClrTx/>
+        <a:buSzPct val="90000"/>
+        <a:buFont typeface="Arial" pitchFamily="34" charset="0"/>
+        <a:buNone/>
+        <a:tabLst/>
+        <a:defRPr sz="1200" kern="1200" spc="0" baseline="0">
+          <a:solidFill>
+            <a:schemeClr val="tx1"/>
+          </a:solidFill>
+          <a:latin typeface="Amazon Ember" panose="020B0603020204020204" pitchFamily="34" charset="0"/>
+          <a:ea typeface="Amazon Ember" panose="020B0603020204020204" pitchFamily="34" charset="0"/>
+          <a:cs typeface="Amazon Ember" panose="020B0603020204020204" pitchFamily="34" charset="0"/>
+        </a:defRPr>
+      </a:lvl2pPr>
+      <a:lvl3pPr marL="332009" marR="0" indent="0" algn="l" defTabSz="541870" rtl="0" eaLnBrk="1" fontAlgn="auto" latinLnBrk="0" hangingPunct="1">
+        <a:lnSpc>
+          <a:spcPct val="90000"/>
+        </a:lnSpc>
+        <a:spcBef>
+          <a:spcPts val="296"/>
+        </a:spcBef>
+        <a:spcAft>
+          <a:spcPts val="0"/>
+        </a:spcAft>
+        <a:buClrTx/>
+        <a:buSzPct val="90000"/>
+        <a:buFont typeface="Arial" pitchFamily="34" charset="0"/>
+        <a:buNone/>
+        <a:tabLst/>
+        <a:defRPr sz="1200" kern="1200" spc="0" baseline="0">
+          <a:solidFill>
+            <a:schemeClr val="tx1"/>
+          </a:solidFill>
+          <a:latin typeface="Amazon Ember" panose="020B0603020204020204" pitchFamily="34" charset="0"/>
+          <a:ea typeface="Amazon Ember" panose="020B0603020204020204" pitchFamily="34" charset="0"/>
+          <a:cs typeface="Amazon Ember" panose="020B0603020204020204" pitchFamily="34" charset="0"/>
+        </a:defRPr>
+      </a:lvl3pPr>
+      <a:lvl4pPr marL="464813" marR="0" indent="0" algn="l" defTabSz="541870" rtl="0" eaLnBrk="1" fontAlgn="auto" latinLnBrk="0" hangingPunct="1">
+        <a:lnSpc>
+          <a:spcPct val="90000"/>
+        </a:lnSpc>
+        <a:spcBef>
+          <a:spcPts val="296"/>
+        </a:spcBef>
+        <a:spcAft>
+          <a:spcPts val="0"/>
+        </a:spcAft>
+        <a:buClrTx/>
+        <a:buSzPct val="90000"/>
+        <a:buFont typeface="Arial" pitchFamily="34" charset="0"/>
+        <a:buNone/>
+        <a:tabLst/>
+        <a:defRPr sz="1000" kern="1200" spc="0" baseline="0">
+          <a:solidFill>
+            <a:schemeClr val="tx1"/>
+          </a:solidFill>
+          <a:latin typeface="Amazon Ember" panose="020B0603020204020204" pitchFamily="34" charset="0"/>
+          <a:ea typeface="Amazon Ember" panose="020B0603020204020204" pitchFamily="34" charset="0"/>
+          <a:cs typeface="Amazon Ember" panose="020B0603020204020204" pitchFamily="34" charset="0"/>
+        </a:defRPr>
+      </a:lvl4pPr>
+      <a:lvl5pPr marL="597616" marR="0" indent="0" algn="l" defTabSz="541870" rtl="0" eaLnBrk="1" fontAlgn="auto" latinLnBrk="0" hangingPunct="1">
+        <a:lnSpc>
+          <a:spcPct val="90000"/>
+        </a:lnSpc>
+        <a:spcBef>
+          <a:spcPts val="296"/>
+        </a:spcBef>
+        <a:spcAft>
+          <a:spcPts val="0"/>
+        </a:spcAft>
+        <a:buClrTx/>
+        <a:buSzPct val="90000"/>
+        <a:buFont typeface="Arial" pitchFamily="34" charset="0"/>
+        <a:buNone/>
+        <a:tabLst/>
+        <a:defRPr sz="1000" kern="1200" spc="0" baseline="0">
+          <a:solidFill>
+            <a:schemeClr val="tx1"/>
+          </a:solidFill>
+          <a:latin typeface="Amazon Ember" panose="020B0603020204020204" pitchFamily="34" charset="0"/>
+          <a:ea typeface="Amazon Ember" panose="020B0603020204020204" pitchFamily="34" charset="0"/>
+          <a:cs typeface="Amazon Ember" panose="020B0603020204020204" pitchFamily="34" charset="0"/>
+        </a:defRPr>
+      </a:lvl5pPr>
+      <a:lvl6pPr marL="1490142" indent="-135467" algn="l" defTabSz="541870" rtl="0" eaLnBrk="1" latinLnBrk="0" hangingPunct="1">
+        <a:spcBef>
+          <a:spcPct val="20000"/>
+        </a:spcBef>
+        <a:buFont typeface="Arial" pitchFamily="34" charset="0"/>
+        <a:buChar char="•"/>
+        <a:defRPr sz="1162" kern="1200">
+          <a:solidFill>
+            <a:schemeClr val="tx1"/>
+          </a:solidFill>
+          <a:latin typeface="+mn-lt"/>
+          <a:ea typeface="+mn-ea"/>
+          <a:cs typeface="+mn-cs"/>
+        </a:defRPr>
+      </a:lvl6pPr>
+      <a:lvl7pPr marL="1761077" indent="-135467" algn="l" defTabSz="541870" rtl="0" eaLnBrk="1" latinLnBrk="0" hangingPunct="1">
+        <a:spcBef>
+          <a:spcPct val="20000"/>
+        </a:spcBef>
+        <a:buFont typeface="Arial" pitchFamily="34" charset="0"/>
+        <a:buChar char="•"/>
+        <a:defRPr sz="1162" kern="1200">
+          <a:solidFill>
+            <a:schemeClr val="tx1"/>
+          </a:solidFill>
+          <a:latin typeface="+mn-lt"/>
+          <a:ea typeface="+mn-ea"/>
+          <a:cs typeface="+mn-cs"/>
+        </a:defRPr>
+      </a:lvl7pPr>
+      <a:lvl8pPr marL="2032013" indent="-135467" algn="l" defTabSz="541870" rtl="0" eaLnBrk="1" latinLnBrk="0" hangingPunct="1">
+        <a:spcBef>
+          <a:spcPct val="20000"/>
+        </a:spcBef>
+        <a:buFont typeface="Arial" pitchFamily="34" charset="0"/>
+        <a:buChar char="•"/>
+        <a:defRPr sz="1162" kern="1200">
+          <a:solidFill>
+            <a:schemeClr val="tx1"/>
+          </a:solidFill>
+          <a:latin typeface="+mn-lt"/>
+          <a:ea typeface="+mn-ea"/>
+          <a:cs typeface="+mn-cs"/>
+        </a:defRPr>
+      </a:lvl8pPr>
+      <a:lvl9pPr marL="2302947" indent="-135467" algn="l" defTabSz="541870" rtl="0" eaLnBrk="1" latinLnBrk="0" hangingPunct="1">
+        <a:spcBef>
+          <a:spcPct val="20000"/>
+        </a:spcBef>
+        <a:buFont typeface="Arial" pitchFamily="34" charset="0"/>
+        <a:buChar char="•"/>
+        <a:defRPr sz="1162" kern="1200">
+          <a:solidFill>
+            <a:schemeClr val="tx1"/>
+          </a:solidFill>
+          <a:latin typeface="+mn-lt"/>
+          <a:ea typeface="+mn-ea"/>
+          <a:cs typeface="+mn-cs"/>
+        </a:defRPr>
+      </a:lvl9pPr>
+    </p:bodyStyle>
+    <p:otherStyle>
+      <a:defPPr>
+        <a:defRPr lang="en-US"/>
+      </a:defPPr>
+      <a:lvl1pPr marL="0" algn="l" defTabSz="541870" rtl="0" eaLnBrk="1" latinLnBrk="0" hangingPunct="1">
+        <a:defRPr sz="1046" kern="1200">
+          <a:solidFill>
+            <a:schemeClr val="tx1"/>
+          </a:solidFill>
+          <a:latin typeface="+mn-lt"/>
+          <a:ea typeface="+mn-ea"/>
+          <a:cs typeface="+mn-cs"/>
+        </a:defRPr>
+      </a:lvl1pPr>
+      <a:lvl2pPr marL="270935" algn="l" defTabSz="541870" rtl="0" eaLnBrk="1" latinLnBrk="0" hangingPunct="1">
+        <a:defRPr sz="1046" kern="1200">
+          <a:solidFill>
+            <a:schemeClr val="tx1"/>
+          </a:solidFill>
+          <a:latin typeface="+mn-lt"/>
+          <a:ea typeface="+mn-ea"/>
+          <a:cs typeface="+mn-cs"/>
+        </a:defRPr>
+      </a:lvl2pPr>
+      <a:lvl3pPr marL="541870" algn="l" defTabSz="541870" rtl="0" eaLnBrk="1" latinLnBrk="0" hangingPunct="1">
+        <a:defRPr sz="1046" kern="1200">
+          <a:solidFill>
+            <a:schemeClr val="tx1"/>
+          </a:solidFill>
+          <a:latin typeface="+mn-lt"/>
+          <a:ea typeface="+mn-ea"/>
+          <a:cs typeface="+mn-cs"/>
+        </a:defRPr>
+      </a:lvl3pPr>
+      <a:lvl4pPr marL="812805" algn="l" defTabSz="541870" rtl="0" eaLnBrk="1" latinLnBrk="0" hangingPunct="1">
+        <a:defRPr sz="1046" kern="1200">
+          <a:solidFill>
+            <a:schemeClr val="tx1"/>
+          </a:solidFill>
+          <a:latin typeface="+mn-lt"/>
+          <a:ea typeface="+mn-ea"/>
+          <a:cs typeface="+mn-cs"/>
+        </a:defRPr>
+      </a:lvl4pPr>
+      <a:lvl5pPr marL="1083740" algn="l" defTabSz="541870" rtl="0" eaLnBrk="1" latinLnBrk="0" hangingPunct="1">
+        <a:defRPr sz="1046" kern="1200">
+          <a:solidFill>
+            <a:schemeClr val="tx1"/>
+          </a:solidFill>
+          <a:latin typeface="+mn-lt"/>
+          <a:ea typeface="+mn-ea"/>
+          <a:cs typeface="+mn-cs"/>
+        </a:defRPr>
+      </a:lvl5pPr>
+      <a:lvl6pPr marL="1354675" algn="l" defTabSz="541870" rtl="0" eaLnBrk="1" latinLnBrk="0" hangingPunct="1">
+        <a:defRPr sz="1046" kern="1200">
+          <a:solidFill>
+            <a:schemeClr val="tx1"/>
+          </a:solidFill>
+          <a:latin typeface="+mn-lt"/>
+          <a:ea typeface="+mn-ea"/>
+          <a:cs typeface="+mn-cs"/>
+        </a:defRPr>
+      </a:lvl6pPr>
+      <a:lvl7pPr marL="1625610" algn="l" defTabSz="541870" rtl="0" eaLnBrk="1" latinLnBrk="0" hangingPunct="1">
+        <a:defRPr sz="1046" kern="1200">
+          <a:solidFill>
+            <a:schemeClr val="tx1"/>
+          </a:solidFill>
+          <a:latin typeface="+mn-lt"/>
+          <a:ea typeface="+mn-ea"/>
+          <a:cs typeface="+mn-cs"/>
+        </a:defRPr>
+      </a:lvl7pPr>
+      <a:lvl8pPr marL="1896544" algn="l" defTabSz="541870" rtl="0" eaLnBrk="1" latinLnBrk="0" hangingPunct="1">
+        <a:defRPr sz="1046" kern="1200">
+          <a:solidFill>
+            <a:schemeClr val="tx1"/>
+          </a:solidFill>
+          <a:latin typeface="+mn-lt"/>
+          <a:ea typeface="+mn-ea"/>
+          <a:cs typeface="+mn-cs"/>
+        </a:defRPr>
+      </a:lvl8pPr>
+      <a:lvl9pPr marL="2167481" algn="l" defTabSz="541870" rtl="0" eaLnBrk="1" latinLnBrk="0" hangingPunct="1">
+        <a:defRPr sz="1046" kern="1200">
+          <a:solidFill>
+            <a:schemeClr val="tx1"/>
+          </a:solidFill>
+          <a:latin typeface="+mn-lt"/>
+          <a:ea typeface="+mn-ea"/>
+          <a:cs typeface="+mn-cs"/>
+        </a:defRPr>
+      </a:lvl9pPr>
+    </p:otherStyle>
+  </p:txStyles>
+  <p:extLst mod="1">
+    <p:ext uri="{27BBF7A9-308A-43DC-89C8-2F10F3537804}">
+      <p15:sldGuideLst xmlns:p15="http://schemas.microsoft.com/office/powerpoint/2012/main">
+        <p15:guide id="1" orient="horz" pos="1704">
+          <p15:clr>
+            <a:srgbClr val="5ACBF0"/>
+          </p15:clr>
+        </p15:guide>
+        <p15:guide id="2" pos="1009">
+          <p15:clr>
+            <a:srgbClr val="5ACBF0"/>
+          </p15:clr>
+        </p15:guide>
+        <p15:guide id="3" pos="2018">
+          <p15:clr>
+            <a:srgbClr val="5ACBF0"/>
+          </p15:clr>
+        </p15:guide>
+        <p15:guide id="4" pos="3014">
+          <p15:clr>
+            <a:srgbClr val="5ACBF0"/>
+          </p15:clr>
+        </p15:guide>
+        <p15:guide id="5" pos="4040">
+          <p15:clr>
+            <a:srgbClr val="5ACBF0"/>
+          </p15:clr>
+        </p15:guide>
+        <p15:guide id="6" pos="5049">
+          <p15:clr>
+            <a:srgbClr val="5ACBF0"/>
+          </p15:clr>
+        </p15:guide>
+        <p15:guide id="7" pos="6073">
+          <p15:clr>
+            <a:srgbClr val="5ACBF0"/>
+          </p15:clr>
+        </p15:guide>
+        <p15:guide id="8" pos="7069">
+          <p15:clr>
+            <a:srgbClr val="5ACBF0"/>
+          </p15:clr>
+        </p15:guide>
+        <p15:guide id="9" pos="8093">
+          <p15:clr>
+            <a:srgbClr val="5ACBF0"/>
+          </p15:clr>
+        </p15:guide>
+        <p15:guide id="10" pos="9103">
+          <p15:clr>
+            <a:srgbClr val="A4A3A4"/>
+          </p15:clr>
+        </p15:guide>
+        <p15:guide id="11" pos="10113">
+          <p15:clr>
+            <a:srgbClr val="5ACBF0"/>
+          </p15:clr>
+        </p15:guide>
+        <p15:guide id="12" pos="11109">
+          <p15:clr>
+            <a:srgbClr val="5ACBF0"/>
+          </p15:clr>
+        </p15:guide>
+        <p15:guide id="13" pos="12133">
+          <p15:clr>
+            <a:srgbClr val="5ACBF0"/>
+          </p15:clr>
+        </p15:guide>
+        <p15:guide id="14" pos="13143">
+          <p15:clr>
+            <a:srgbClr val="5ACBF0"/>
+          </p15:clr>
+        </p15:guide>
+        <p15:guide id="15" pos="14153">
+          <p15:clr>
+            <a:srgbClr val="5ACBF0"/>
+          </p15:clr>
+        </p15:guide>
+        <p15:guide id="16" pos="505">
+          <p15:clr>
+            <a:srgbClr val="C35EA4"/>
+          </p15:clr>
+        </p15:guide>
+        <p15:guide id="19" orient="horz" pos="3423">
+          <p15:clr>
+            <a:srgbClr val="5ACBF0"/>
+          </p15:clr>
+        </p15:guide>
+        <p15:guide id="21" orient="horz" pos="5126">
+          <p15:clr>
+            <a:srgbClr val="A4A3A4"/>
+          </p15:clr>
+        </p15:guide>
+        <p15:guide id="22" orient="horz" pos="6830">
+          <p15:clr>
+            <a:srgbClr val="5ACBF0"/>
+          </p15:clr>
+        </p15:guide>
+        <p15:guide id="24" orient="horz" pos="8536">
+          <p15:clr>
+            <a:srgbClr val="5ACBF0"/>
+          </p15:clr>
+        </p15:guide>
+        <p15:guide id="25" orient="horz" pos="851">
+          <p15:clr>
+            <a:srgbClr val="C35EA4"/>
+          </p15:clr>
+        </p15:guide>
+        <p15:guide id="26" orient="horz" pos="9384">
+          <p15:clr>
+            <a:srgbClr val="C35EA4"/>
+          </p15:clr>
+        </p15:guide>
+        <p15:guide id="27" pos="17699">
+          <p15:clr>
+            <a:srgbClr val="C35EA4"/>
+          </p15:clr>
+        </p15:guide>
+        <p15:guide id="28" pos="15163">
+          <p15:clr>
+            <a:srgbClr val="5ACBF0"/>
+          </p15:clr>
+        </p15:guide>
+        <p15:guide id="29" pos="16188">
+          <p15:clr>
+            <a:srgbClr val="5ACBF0"/>
+          </p15:clr>
+        </p15:guide>
+        <p15:guide id="30" pos="17194">
+          <p15:clr>
+            <a:srgbClr val="5ACBF0"/>
+          </p15:clr>
+        </p15:guide>
+      </p15:sldGuideLst>
+    </p:ext>
+  </p:extLst>
+</p:sldMaster>
+</file>
+
 <file path=ppt/slides/slide1.xml><?xml version="1.0" encoding="utf-8"?>
 <p:sld xmlns:a="http://schemas.openxmlformats.org/drawingml/2006/main" xmlns:r="http://schemas.openxmlformats.org/officeDocument/2006/relationships" xmlns:p="http://schemas.openxmlformats.org/presentationml/2006/main">
   <p:cSld>
@@ -3421,33 +5017,46 @@
         </p:nvSpPr>
         <p:spPr>
           <a:xfrm>
-            <a:off x="1094014" y="1773955"/>
-            <a:ext cx="9013372" cy="4822787"/>
+            <a:off x="697785" y="1679897"/>
+            <a:ext cx="8680588" cy="4049529"/>
           </a:xfrm>
           <a:prstGeom prst="rect">
             <a:avLst/>
           </a:prstGeom>
+          <a:solidFill>
+            <a:schemeClr val="bg1">
+              <a:lumMod val="50000"/>
+              <a:lumOff val="50000"/>
+            </a:schemeClr>
+          </a:solidFill>
         </p:spPr>
         <p:style>
           <a:lnRef idx="2">
-            <a:schemeClr val="accent4"/>
+            <a:schemeClr val="accent5">
+              <a:shade val="50000"/>
+            </a:schemeClr>
           </a:lnRef>
           <a:fillRef idx="1">
-            <a:schemeClr val="lt1"/>
+            <a:schemeClr val="accent5"/>
           </a:fillRef>
           <a:effectRef idx="0">
-            <a:schemeClr val="accent4"/>
+            <a:schemeClr val="accent5"/>
           </a:effectRef>
           <a:fontRef idx="minor">
-            <a:schemeClr val="dk1"/>
+            <a:schemeClr val="lt1"/>
           </a:fontRef>
         </p:style>
         <p:txBody>
           <a:bodyPr rtlCol="0" anchor="ctr"/>
           <a:lstStyle/>
           <a:p>
-            <a:pPr algn="ctr"/>
-            <a:endParaRPr lang="en-US"/>
+            <a:pPr algn="ctr" defTabSz="192828"/>
+            <a:endParaRPr lang="en-US">
+              <a:solidFill>
+                <a:srgbClr val="FFFFFF"/>
+              </a:solidFill>
+              <a:latin typeface="Amazon Ember Light"/>
+            </a:endParaRPr>
           </a:p>
         </p:txBody>
       </p:sp>
@@ -3465,12 +5074,18 @@
         </p:nvSpPr>
         <p:spPr>
           <a:xfrm>
-            <a:off x="2930979" y="2269670"/>
-            <a:ext cx="4962962" cy="2952319"/>
+            <a:off x="2245764" y="2007648"/>
+            <a:ext cx="4962901" cy="2952283"/>
           </a:xfrm>
           <a:prstGeom prst="rect">
             <a:avLst/>
           </a:prstGeom>
+          <a:solidFill>
+            <a:schemeClr val="bg1">
+              <a:lumMod val="65000"/>
+              <a:lumOff val="35000"/>
+            </a:schemeClr>
+          </a:solidFill>
         </p:spPr>
         <p:style>
           <a:lnRef idx="3">
@@ -3490,8 +5105,13 @@
           <a:bodyPr rtlCol="0" anchor="ctr"/>
           <a:lstStyle/>
           <a:p>
-            <a:pPr algn="ctr"/>
-            <a:endParaRPr lang="en-US"/>
+            <a:pPr algn="ctr" defTabSz="192828"/>
+            <a:endParaRPr lang="en-US">
+              <a:solidFill>
+                <a:srgbClr val="FFFFFF"/>
+              </a:solidFill>
+              <a:latin typeface="Amazon Ember Light"/>
+            </a:endParaRPr>
           </a:p>
         </p:txBody>
       </p:sp>
@@ -3509,33 +5129,44 @@
         </p:nvSpPr>
         <p:spPr>
           <a:xfrm>
-            <a:off x="3491940" y="2568425"/>
-            <a:ext cx="3790603" cy="1625466"/>
+            <a:off x="2806718" y="2306398"/>
+            <a:ext cx="3790557" cy="1625446"/>
           </a:xfrm>
           <a:prstGeom prst="roundRect">
             <a:avLst/>
           </a:prstGeom>
+          <a:solidFill>
+            <a:schemeClr val="bg1">
+              <a:lumMod val="85000"/>
+              <a:lumOff val="15000"/>
+            </a:schemeClr>
+          </a:solidFill>
         </p:spPr>
         <p:style>
-          <a:lnRef idx="2">
-            <a:schemeClr val="accent1"/>
+          <a:lnRef idx="1">
+            <a:schemeClr val="accent3"/>
           </a:lnRef>
-          <a:fillRef idx="1">
-            <a:schemeClr val="lt1"/>
+          <a:fillRef idx="3">
+            <a:schemeClr val="accent3"/>
           </a:fillRef>
-          <a:effectRef idx="0">
-            <a:schemeClr val="accent1"/>
+          <a:effectRef idx="2">
+            <a:schemeClr val="accent3"/>
           </a:effectRef>
           <a:fontRef idx="minor">
-            <a:schemeClr val="dk1"/>
+            <a:schemeClr val="lt1"/>
           </a:fontRef>
         </p:style>
         <p:txBody>
           <a:bodyPr rtlCol="0" anchor="ctr"/>
           <a:lstStyle/>
           <a:p>
-            <a:pPr algn="ctr"/>
-            <a:endParaRPr lang="en-US" dirty="0"/>
+            <a:pPr algn="ctr" defTabSz="192828"/>
+            <a:endParaRPr lang="en-US" dirty="0">
+              <a:solidFill>
+                <a:srgbClr val="FFFFFF"/>
+              </a:solidFill>
+              <a:latin typeface="Amazon Ember Light"/>
+            </a:endParaRPr>
           </a:p>
         </p:txBody>
       </p:sp>
@@ -3557,50 +5188,31 @@
         </p:nvSpPr>
         <p:spPr>
           <a:xfrm>
-            <a:off x="764721" y="233440"/>
-            <a:ext cx="10515600" cy="911990"/>
+            <a:off x="764786" y="233479"/>
+            <a:ext cx="10515472" cy="911979"/>
           </a:xfrm>
         </p:spPr>
         <p:txBody>
           <a:bodyPr>
-            <a:normAutofit/>
+            <a:normAutofit fontScale="90000"/>
           </a:bodyPr>
           <a:lstStyle/>
           <a:p>
             <a:r>
-              <a:rPr lang="en-US" sz="4000" b="1" dirty="0">
-                <a:latin typeface="Amazon Ember" panose="020B0603020204020204" pitchFamily="34" charset="0"/>
+              <a:rPr lang="en-US" sz="4000" dirty="0">
                 <a:ea typeface="Amazon Ember" panose="020B0603020204020204" pitchFamily="34" charset="0"/>
                 <a:cs typeface="Amazon Ember" panose="020B0603020204020204" pitchFamily="34" charset="0"/>
               </a:rPr>
-              <a:t>Chat room – Fargate, </a:t>
-            </a:r>
-            <a:r>
-              <a:rPr lang="en-US" sz="4000" b="1" dirty="0" err="1">
-                <a:latin typeface="Amazon Ember" panose="020B0603020204020204" pitchFamily="34" charset="0"/>
+              <a:t>Simple Chat room on AWS Fargate + Amazon </a:t>
+            </a:r>
+            <a:r>
+              <a:rPr lang="en-US" sz="4000" dirty="0" err="1">
                 <a:ea typeface="Amazon Ember" panose="020B0603020204020204" pitchFamily="34" charset="0"/>
                 <a:cs typeface="Amazon Ember" panose="020B0603020204020204" pitchFamily="34" charset="0"/>
               </a:rPr>
-              <a:t>Websocket</a:t>
-            </a:r>
-            <a:r>
-              <a:rPr lang="en-US" sz="4000" b="1" dirty="0">
-                <a:latin typeface="Amazon Ember" panose="020B0603020204020204" pitchFamily="34" charset="0"/>
-                <a:ea typeface="Amazon Ember" panose="020B0603020204020204" pitchFamily="34" charset="0"/>
-                <a:cs typeface="Amazon Ember" panose="020B0603020204020204" pitchFamily="34" charset="0"/>
-              </a:rPr>
-              <a:t>, </a:t>
-            </a:r>
-            <a:r>
-              <a:rPr lang="en-US" sz="4000" b="1" dirty="0" err="1">
-                <a:latin typeface="Amazon Ember" panose="020B0603020204020204" pitchFamily="34" charset="0"/>
-                <a:ea typeface="Amazon Ember" panose="020B0603020204020204" pitchFamily="34" charset="0"/>
-                <a:cs typeface="Amazon Ember" panose="020B0603020204020204" pitchFamily="34" charset="0"/>
-              </a:rPr>
-              <a:t>Redis</a:t>
-            </a:r>
-            <a:endParaRPr lang="en-US" sz="4000" b="1" dirty="0">
-              <a:latin typeface="Amazon Ember" panose="020B0603020204020204" pitchFamily="34" charset="0"/>
+              <a:t>ElastiCache</a:t>
+            </a:r>
+            <a:endParaRPr lang="en-US" sz="4000" dirty="0">
               <a:ea typeface="Amazon Ember" panose="020B0603020204020204" pitchFamily="34" charset="0"/>
               <a:cs typeface="Amazon Ember" panose="020B0603020204020204" pitchFamily="34" charset="0"/>
             </a:endParaRPr>
@@ -3635,8 +5247,8 @@
         </p:blipFill>
         <p:spPr>
           <a:xfrm>
-            <a:off x="1301297" y="2954927"/>
-            <a:ext cx="711200" cy="711200"/>
+            <a:off x="945908" y="2772598"/>
+            <a:ext cx="711191" cy="711191"/>
           </a:xfrm>
           <a:prstGeom prst="rect">
             <a:avLst/>
@@ -3671,8 +5283,8 @@
         </p:blipFill>
         <p:spPr>
           <a:xfrm>
-            <a:off x="5214566" y="4866390"/>
-            <a:ext cx="711200" cy="711200"/>
+            <a:off x="4529323" y="4604336"/>
+            <a:ext cx="711191" cy="711191"/>
           </a:xfrm>
           <a:prstGeom prst="rect">
             <a:avLst/>
@@ -3693,22 +5305,28 @@
         </p:nvSpPr>
         <p:spPr>
           <a:xfrm>
-            <a:off x="5037364" y="3025558"/>
-            <a:ext cx="1708350" cy="954597"/>
+            <a:off x="4352123" y="2763526"/>
+            <a:ext cx="1708329" cy="954585"/>
           </a:xfrm>
           <a:prstGeom prst="rect">
             <a:avLst/>
           </a:prstGeom>
+          <a:solidFill>
+            <a:schemeClr val="bg1">
+              <a:lumMod val="95000"/>
+              <a:lumOff val="5000"/>
+            </a:schemeClr>
+          </a:solidFill>
         </p:spPr>
         <p:style>
-          <a:lnRef idx="2">
-            <a:schemeClr val="accent2"/>
+          <a:lnRef idx="1">
+            <a:schemeClr val="accent5"/>
           </a:lnRef>
-          <a:fillRef idx="1">
-            <a:schemeClr val="lt1"/>
+          <a:fillRef idx="2">
+            <a:schemeClr val="accent5"/>
           </a:fillRef>
-          <a:effectRef idx="0">
-            <a:schemeClr val="accent2"/>
+          <a:effectRef idx="1">
+            <a:schemeClr val="accent5"/>
           </a:effectRef>
           <a:fontRef idx="minor">
             <a:schemeClr val="dk1"/>
@@ -3718,17 +5336,32 @@
           <a:bodyPr rtlCol="0" anchor="ctr"/>
           <a:lstStyle/>
           <a:p>
-            <a:pPr algn="ctr"/>
-            <a:endParaRPr lang="en-US" dirty="0"/>
-          </a:p>
-          <a:p>
-            <a:pPr algn="ctr"/>
-            <a:endParaRPr lang="en-US" dirty="0"/>
-          </a:p>
-          <a:p>
-            <a:pPr algn="ctr"/>
-            <a:r>
-              <a:rPr lang="en-US" b="1" dirty="0"/>
+            <a:pPr algn="ctr" defTabSz="192828"/>
+            <a:endParaRPr lang="en-US" dirty="0">
+              <a:solidFill>
+                <a:srgbClr val="FFFFFF"/>
+              </a:solidFill>
+              <a:latin typeface="Amazon Ember Light"/>
+            </a:endParaRPr>
+          </a:p>
+          <a:p>
+            <a:pPr algn="ctr" defTabSz="192828"/>
+            <a:endParaRPr lang="en-US" dirty="0">
+              <a:solidFill>
+                <a:srgbClr val="FFFFFF"/>
+              </a:solidFill>
+              <a:latin typeface="Amazon Ember Light"/>
+            </a:endParaRPr>
+          </a:p>
+          <a:p>
+            <a:pPr algn="ctr" defTabSz="192828"/>
+            <a:r>
+              <a:rPr lang="en-US" b="1" dirty="0">
+                <a:solidFill>
+                  <a:srgbClr val="FFFFFF"/>
+                </a:solidFill>
+                <a:latin typeface="Amazon Ember Light"/>
+              </a:rPr>
               <a:t>Task</a:t>
             </a:r>
           </a:p>
@@ -3762,8 +5395,8 @@
         </p:blipFill>
         <p:spPr>
           <a:xfrm>
-            <a:off x="5506618" y="3133357"/>
-            <a:ext cx="686534" cy="686534"/>
+            <a:off x="4378505" y="2909720"/>
+            <a:ext cx="552152" cy="552152"/>
           </a:xfrm>
           <a:prstGeom prst="rect">
             <a:avLst/>
@@ -3784,8 +5417,8 @@
         </p:nvSpPr>
         <p:spPr>
           <a:xfrm>
-            <a:off x="5291631" y="2982357"/>
-            <a:ext cx="1317990" cy="307777"/>
+            <a:off x="4606387" y="2720325"/>
+            <a:ext cx="1524776" cy="307777"/>
           </a:xfrm>
           <a:prstGeom prst="rect">
             <a:avLst/>
@@ -3798,9 +5431,15 @@
           </a:bodyPr>
           <a:lstStyle/>
           <a:p>
-            <a:r>
-              <a:rPr lang="en-US" sz="1400" i="1" dirty="0"/>
-              <a:t>Node chatroom</a:t>
+            <a:pPr defTabSz="192828"/>
+            <a:r>
+              <a:rPr lang="en-US" sz="1400" i="1" dirty="0">
+                <a:solidFill>
+                  <a:srgbClr val="FFFFFF"/>
+                </a:solidFill>
+                <a:latin typeface="Amazon Ember Light"/>
+              </a:rPr>
+              <a:t>Nodejs: chatroom</a:t>
             </a:r>
           </a:p>
         </p:txBody>
@@ -3819,8 +5458,8 @@
         </p:nvSpPr>
         <p:spPr>
           <a:xfrm>
-            <a:off x="1380871" y="3736758"/>
-            <a:ext cx="1118255" cy="584775"/>
+            <a:off x="938332" y="3611068"/>
+            <a:ext cx="1499128" cy="923330"/>
           </a:xfrm>
           <a:prstGeom prst="rect">
             <a:avLst/>
@@ -3833,17 +5472,70 @@
           </a:bodyPr>
           <a:lstStyle/>
           <a:p>
-            <a:r>
-              <a:rPr lang="en-US" sz="1600" b="1" dirty="0"/>
-              <a:t>ALB</a:t>
-            </a:r>
-          </a:p>
-          <a:p>
-            <a:r>
-              <a:rPr lang="en-US" sz="1600" b="1" dirty="0" err="1"/>
+            <a:pPr defTabSz="192828"/>
+            <a:r>
+              <a:rPr lang="en-US" sz="1350" b="1" dirty="0">
+                <a:solidFill>
+                  <a:srgbClr val="FFFFFF"/>
+                </a:solidFill>
+                <a:latin typeface="Amazon Ember Light"/>
+              </a:rPr>
+              <a:t>AWS </a:t>
+            </a:r>
+          </a:p>
+          <a:p>
+            <a:pPr defTabSz="192828"/>
+            <a:r>
+              <a:rPr lang="en-US" sz="1350" b="1" dirty="0">
+                <a:solidFill>
+                  <a:srgbClr val="FFFFFF"/>
+                </a:solidFill>
+                <a:latin typeface="Amazon Ember Light"/>
+              </a:rPr>
+              <a:t>Application Load </a:t>
+            </a:r>
+          </a:p>
+          <a:p>
+            <a:pPr defTabSz="192828"/>
+            <a:r>
+              <a:rPr lang="en-US" sz="1350" b="1" dirty="0">
+                <a:solidFill>
+                  <a:srgbClr val="FFFFFF"/>
+                </a:solidFill>
+                <a:latin typeface="Amazon Ember Light"/>
+              </a:rPr>
+              <a:t>Balancer</a:t>
+            </a:r>
+          </a:p>
+          <a:p>
+            <a:pPr defTabSz="192828"/>
+            <a:r>
+              <a:rPr lang="en-US" sz="1350" b="1" i="1" dirty="0">
+                <a:solidFill>
+                  <a:srgbClr val="FFFFFF"/>
+                </a:solidFill>
+                <a:latin typeface="Amazon Ember Light"/>
+              </a:rPr>
+              <a:t>(</a:t>
+            </a:r>
+            <a:r>
+              <a:rPr lang="en-US" sz="1350" b="1" i="1" dirty="0" err="1">
+                <a:solidFill>
+                  <a:srgbClr val="FFFFFF"/>
+                </a:solidFill>
+                <a:latin typeface="Amazon Ember Light"/>
+              </a:rPr>
               <a:t>Websocket</a:t>
             </a:r>
-            <a:endParaRPr lang="en-US" sz="1600" b="1" dirty="0"/>
+            <a:r>
+              <a:rPr lang="en-US" sz="1350" b="1" i="1" dirty="0">
+                <a:solidFill>
+                  <a:srgbClr val="FFFFFF"/>
+                </a:solidFill>
+                <a:latin typeface="Amazon Ember Light"/>
+              </a:rPr>
+              <a:t>)</a:t>
+            </a:r>
           </a:p>
         </p:txBody>
       </p:sp>
@@ -3864,26 +5556,32 @@
           <p:nvPr/>
         </p:nvCxnSpPr>
         <p:spPr>
-          <a:xfrm>
-            <a:off x="2012497" y="3310527"/>
-            <a:ext cx="1479443" cy="70631"/>
+          <a:xfrm flipV="1">
+            <a:off x="1657099" y="3119121"/>
+            <a:ext cx="1149619" cy="9072"/>
           </a:xfrm>
           <a:prstGeom prst="straightConnector1">
             <a:avLst/>
           </a:prstGeom>
-          <a:ln>
-            <a:tailEnd type="triangle"/>
+          <a:ln w="38100" cap="flat" cmpd="sng" algn="ctr">
+            <a:solidFill>
+              <a:srgbClr val="FF914F"/>
+            </a:solidFill>
+            <a:prstDash val="solid"/>
+            <a:round/>
+            <a:headEnd type="none" w="med" len="med"/>
+            <a:tailEnd type="triangle" w="med" len="med"/>
           </a:ln>
         </p:spPr>
         <p:style>
-          <a:lnRef idx="1">
-            <a:schemeClr val="accent1"/>
+          <a:lnRef idx="0">
+            <a:scrgbClr r="0" g="0" b="0"/>
           </a:lnRef>
           <a:fillRef idx="0">
-            <a:schemeClr val="accent1"/>
+            <a:scrgbClr r="0" g="0" b="0"/>
           </a:fillRef>
           <a:effectRef idx="0">
-            <a:schemeClr val="accent1"/>
+            <a:scrgbClr r="0" g="0" b="0"/>
           </a:effectRef>
           <a:fontRef idx="minor">
             <a:schemeClr val="tx1"/>
@@ -3904,8 +5602,8 @@
         </p:nvSpPr>
         <p:spPr>
           <a:xfrm>
-            <a:off x="3581747" y="2568424"/>
-            <a:ext cx="1632819" cy="830997"/>
+            <a:off x="2916377" y="2458730"/>
+            <a:ext cx="1701107" cy="830997"/>
           </a:xfrm>
           <a:prstGeom prst="rect">
             <a:avLst/>
@@ -3918,20 +5616,38 @@
           </a:bodyPr>
           <a:lstStyle/>
           <a:p>
-            <a:r>
-              <a:rPr lang="en-US" sz="1600" i="1" dirty="0"/>
+            <a:pPr defTabSz="192828"/>
+            <a:r>
+              <a:rPr lang="en-US" sz="1600" b="1" i="1" dirty="0">
+                <a:solidFill>
+                  <a:srgbClr val="FFFFFF"/>
+                </a:solidFill>
+                <a:latin typeface="Amazon Ember Light"/>
+              </a:rPr>
               <a:t>Chatroom service</a:t>
             </a:r>
           </a:p>
           <a:p>
-            <a:r>
-              <a:rPr lang="en-US" sz="1600" i="1" dirty="0"/>
+            <a:pPr defTabSz="192828"/>
+            <a:r>
+              <a:rPr lang="en-US" sz="1600" i="1" dirty="0">
+                <a:solidFill>
+                  <a:srgbClr val="FFFFFF"/>
+                </a:solidFill>
+                <a:latin typeface="Amazon Ember Light"/>
+              </a:rPr>
               <a:t>replica : 3</a:t>
             </a:r>
           </a:p>
           <a:p>
-            <a:r>
-              <a:rPr lang="en-US" sz="1600" i="1" dirty="0"/>
+            <a:pPr defTabSz="192828"/>
+            <a:r>
+              <a:rPr lang="en-US" sz="1600" i="1" dirty="0">
+                <a:solidFill>
+                  <a:srgbClr val="FFFFFF"/>
+                </a:solidFill>
+                <a:latin typeface="Amazon Ember Light"/>
+              </a:rPr>
               <a:t>ALB</a:t>
             </a:r>
           </a:p>
@@ -3951,8 +5667,8 @@
         </p:nvSpPr>
         <p:spPr>
           <a:xfrm>
-            <a:off x="5204984" y="5597882"/>
-            <a:ext cx="1256049" cy="584775"/>
+            <a:off x="4378505" y="5287681"/>
+            <a:ext cx="1346844" cy="338554"/>
           </a:xfrm>
           <a:prstGeom prst="rect">
             <a:avLst/>
@@ -3965,15 +5681,15 @@
           </a:bodyPr>
           <a:lstStyle/>
           <a:p>
-            <a:r>
-              <a:rPr lang="en-US" sz="1600" b="1" dirty="0"/>
+            <a:pPr defTabSz="192828"/>
+            <a:r>
+              <a:rPr lang="en-US" sz="1600" b="1" dirty="0">
+                <a:solidFill>
+                  <a:srgbClr val="FFFFFF"/>
+                </a:solidFill>
+                <a:latin typeface="Amazon Ember Light"/>
+              </a:rPr>
               <a:t>AWS Fargate</a:t>
-            </a:r>
-          </a:p>
-          <a:p>
-            <a:r>
-              <a:rPr lang="en-US" sz="1600" b="1" dirty="0"/>
-              <a:t>ECS</a:t>
             </a:r>
           </a:p>
         </p:txBody>
@@ -4006,8 +5722,8 @@
         </p:blipFill>
         <p:spPr>
           <a:xfrm>
-            <a:off x="9616566" y="1632692"/>
-            <a:ext cx="711200" cy="711200"/>
+            <a:off x="8912453" y="1359885"/>
+            <a:ext cx="711191" cy="711191"/>
           </a:xfrm>
           <a:prstGeom prst="rect">
             <a:avLst/>
@@ -4028,8 +5744,8 @@
         </p:nvSpPr>
         <p:spPr>
           <a:xfrm>
-            <a:off x="9616566" y="2343892"/>
-            <a:ext cx="524503" cy="338554"/>
+            <a:off x="8931269" y="2081868"/>
+            <a:ext cx="554960" cy="338554"/>
           </a:xfrm>
           <a:prstGeom prst="rect">
             <a:avLst/>
@@ -4042,8 +5758,14 @@
           </a:bodyPr>
           <a:lstStyle/>
           <a:p>
-            <a:r>
-              <a:rPr lang="en-US" sz="1600" b="1" dirty="0"/>
+            <a:pPr defTabSz="192828"/>
+            <a:r>
+              <a:rPr lang="en-US" sz="1600" b="1" dirty="0">
+                <a:solidFill>
+                  <a:srgbClr val="FFFFFF"/>
+                </a:solidFill>
+                <a:latin typeface="Amazon Ember Light"/>
+              </a:rPr>
               <a:t>VPC</a:t>
             </a:r>
           </a:p>
@@ -4063,8 +5785,8 @@
         </p:nvSpPr>
         <p:spPr>
           <a:xfrm>
-            <a:off x="6630127" y="4608900"/>
-            <a:ext cx="1205971" cy="584775"/>
+            <a:off x="5886445" y="4346848"/>
+            <a:ext cx="1322799" cy="584775"/>
           </a:xfrm>
           <a:prstGeom prst="rect">
             <a:avLst/>
@@ -4077,16 +5799,26 @@
           </a:bodyPr>
           <a:lstStyle/>
           <a:p>
-            <a:pPr algn="ctr"/>
-            <a:r>
-              <a:rPr lang="en-US" sz="1600" b="1" dirty="0"/>
+            <a:pPr algn="ctr" defTabSz="192828"/>
+            <a:r>
+              <a:rPr lang="en-US" sz="1600" b="1" dirty="0">
+                <a:solidFill>
+                  <a:srgbClr val="FFFFFF"/>
+                </a:solidFill>
+                <a:latin typeface="Amazon Ember Light"/>
+              </a:rPr>
               <a:t>ECS Fargate </a:t>
             </a:r>
           </a:p>
           <a:p>
-            <a:pPr algn="ctr"/>
-            <a:r>
-              <a:rPr lang="en-US" sz="1600" b="1" dirty="0"/>
+            <a:pPr algn="ctr" defTabSz="192828"/>
+            <a:r>
+              <a:rPr lang="en-US" sz="1600" b="1" dirty="0">
+                <a:solidFill>
+                  <a:srgbClr val="FFFFFF"/>
+                </a:solidFill>
+                <a:latin typeface="Amazon Ember Light"/>
+              </a:rPr>
               <a:t>Cluster</a:t>
             </a:r>
           </a:p>
@@ -4106,8 +5838,8 @@
         </p:nvSpPr>
         <p:spPr>
           <a:xfrm>
-            <a:off x="8265896" y="3707954"/>
-            <a:ext cx="1629941" cy="523220"/>
+            <a:off x="7688774" y="3720508"/>
+            <a:ext cx="1629921" cy="523220"/>
           </a:xfrm>
           <a:prstGeom prst="rect">
             <a:avLst/>
@@ -4120,20 +5852,40 @@
           </a:bodyPr>
           <a:lstStyle/>
           <a:p>
-            <a:pPr algn="ctr"/>
-            <a:r>
-              <a:rPr lang="en-US" sz="1400" dirty="0" err="1"/>
+            <a:pPr algn="ctr" defTabSz="192828"/>
+            <a:r>
+              <a:rPr lang="en-US" sz="1400" dirty="0" err="1">
+                <a:solidFill>
+                  <a:srgbClr val="FFFFFF"/>
+                </a:solidFill>
+                <a:latin typeface="Amazon Ember Light"/>
+              </a:rPr>
               <a:t>ElastiCache</a:t>
             </a:r>
             <a:r>
-              <a:rPr lang="en-US" sz="1400" dirty="0"/>
+              <a:rPr lang="en-US" sz="1400" dirty="0">
+                <a:solidFill>
+                  <a:srgbClr val="FFFFFF"/>
+                </a:solidFill>
+                <a:latin typeface="Amazon Ember Light"/>
+              </a:rPr>
               <a:t> for </a:t>
             </a:r>
             <a:r>
-              <a:rPr lang="en-US" sz="1400" dirty="0" err="1"/>
+              <a:rPr lang="en-US" sz="1400" dirty="0" err="1">
+                <a:solidFill>
+                  <a:srgbClr val="FFFFFF"/>
+                </a:solidFill>
+                <a:latin typeface="Amazon Ember Light"/>
+              </a:rPr>
               <a:t>Redis</a:t>
             </a:r>
-            <a:endParaRPr lang="en-US" sz="1400" dirty="0"/>
+            <a:endParaRPr lang="en-US" sz="1400" dirty="0">
+              <a:solidFill>
+                <a:srgbClr val="FFFFFF"/>
+              </a:solidFill>
+              <a:latin typeface="Amazon Ember Light"/>
+            </a:endParaRPr>
           </a:p>
         </p:txBody>
       </p:sp>
@@ -4165,8 +5917,8 @@
         </p:blipFill>
         <p:spPr>
           <a:xfrm>
-            <a:off x="8784554" y="3266858"/>
-            <a:ext cx="469900" cy="469900"/>
+            <a:off x="8019803" y="2872659"/>
+            <a:ext cx="832003" cy="832003"/>
           </a:xfrm>
           <a:prstGeom prst="rect">
             <a:avLst/>
@@ -4189,25 +5941,31 @@
         </p:nvCxnSpPr>
         <p:spPr>
           <a:xfrm>
-            <a:off x="6745714" y="3461420"/>
-            <a:ext cx="1941086" cy="0"/>
+            <a:off x="6060452" y="3199382"/>
+            <a:ext cx="1936357" cy="0"/>
           </a:xfrm>
           <a:prstGeom prst="straightConnector1">
             <a:avLst/>
           </a:prstGeom>
-          <a:ln>
-            <a:tailEnd type="triangle"/>
+          <a:ln w="38100" cap="flat" cmpd="sng" algn="ctr">
+            <a:solidFill>
+              <a:srgbClr val="FF914F"/>
+            </a:solidFill>
+            <a:prstDash val="solid"/>
+            <a:round/>
+            <a:headEnd type="none" w="med" len="med"/>
+            <a:tailEnd type="triangle" w="med" len="med"/>
           </a:ln>
         </p:spPr>
         <p:style>
-          <a:lnRef idx="1">
-            <a:schemeClr val="accent1"/>
+          <a:lnRef idx="0">
+            <a:scrgbClr r="0" g="0" b="0"/>
           </a:lnRef>
           <a:fillRef idx="0">
-            <a:schemeClr val="accent1"/>
+            <a:scrgbClr r="0" g="0" b="0"/>
           </a:fillRef>
           <a:effectRef idx="0">
-            <a:schemeClr val="accent1"/>
+            <a:scrgbClr r="0" g="0" b="0"/>
           </a:effectRef>
           <a:fontRef idx="minor">
             <a:schemeClr val="tx1"/>
@@ -4228,8 +5986,8 @@
         </p:nvSpPr>
         <p:spPr>
           <a:xfrm>
-            <a:off x="9876487" y="5857396"/>
-            <a:ext cx="2301904" cy="307777"/>
+            <a:off x="9890050" y="2720325"/>
+            <a:ext cx="2301876" cy="307777"/>
           </a:xfrm>
           <a:prstGeom prst="rect">
             <a:avLst/>
@@ -4242,9 +6000,14 @@
           </a:bodyPr>
           <a:lstStyle/>
           <a:p>
-            <a:pPr algn="ctr"/>
-            <a:r>
-              <a:rPr lang="en-US" sz="1400" dirty="0"/>
+            <a:pPr algn="ctr" defTabSz="192828"/>
+            <a:r>
+              <a:rPr lang="en-US" sz="1400" dirty="0">
+                <a:solidFill>
+                  <a:srgbClr val="FFFFFF"/>
+                </a:solidFill>
+                <a:latin typeface="Amazon Ember Light"/>
+              </a:rPr>
               <a:t>Amazon CloudWatch</a:t>
             </a:r>
           </a:p>
@@ -4278,8 +6041,157 @@
         </p:blipFill>
         <p:spPr>
           <a:xfrm>
-            <a:off x="10671839" y="5093586"/>
-            <a:ext cx="711200" cy="711200"/>
+            <a:off x="9531574" y="2435724"/>
+            <a:ext cx="655604" cy="655604"/>
+          </a:xfrm>
+          <a:prstGeom prst="rect">
+            <a:avLst/>
+          </a:prstGeom>
+        </p:spPr>
+      </p:pic>
+      <p:pic>
+        <p:nvPicPr>
+          <p:cNvPr id="30" name="Graphic 29">
+            <a:extLst>
+              <a:ext uri="{FF2B5EF4-FFF2-40B4-BE49-F238E27FC236}">
+                <a16:creationId xmlns:a16="http://schemas.microsoft.com/office/drawing/2014/main" id="{6286DF39-EF53-DC4E-ABA0-AFC29B7DCEE7}"/>
+              </a:ext>
+            </a:extLst>
+          </p:cNvPr>
+          <p:cNvPicPr>
+            <a:picLocks noChangeAspect="1"/>
+          </p:cNvPicPr>
+          <p:nvPr/>
+        </p:nvPicPr>
+        <p:blipFill>
+          <a:blip r:embed="rId6">
+            <a:extLst>
+              <a:ext uri="{96DAC541-7B7A-43D3-8B79-37D633B846F1}">
+                <asvg:svgBlip xmlns:asvg="http://schemas.microsoft.com/office/drawing/2016/SVG/main" r:embed="rId7"/>
+              </a:ext>
+            </a:extLst>
+          </a:blip>
+          <a:stretch>
+            <a:fillRect/>
+          </a:stretch>
+        </p:blipFill>
+        <p:spPr>
+          <a:xfrm>
+            <a:off x="4918113" y="2909720"/>
+            <a:ext cx="552152" cy="552152"/>
+          </a:xfrm>
+          <a:prstGeom prst="rect">
+            <a:avLst/>
+          </a:prstGeom>
+        </p:spPr>
+      </p:pic>
+      <p:pic>
+        <p:nvPicPr>
+          <p:cNvPr id="32" name="Graphic 31">
+            <a:extLst>
+              <a:ext uri="{FF2B5EF4-FFF2-40B4-BE49-F238E27FC236}">
+                <a16:creationId xmlns:a16="http://schemas.microsoft.com/office/drawing/2014/main" id="{DF4EF0EE-7444-8749-83C8-D1DE322D506A}"/>
+              </a:ext>
+            </a:extLst>
+          </p:cNvPr>
+          <p:cNvPicPr>
+            <a:picLocks noChangeAspect="1"/>
+          </p:cNvPicPr>
+          <p:nvPr/>
+        </p:nvPicPr>
+        <p:blipFill>
+          <a:blip r:embed="rId6">
+            <a:extLst>
+              <a:ext uri="{96DAC541-7B7A-43D3-8B79-37D633B846F1}">
+                <asvg:svgBlip xmlns:asvg="http://schemas.microsoft.com/office/drawing/2016/SVG/main" r:embed="rId7"/>
+              </a:ext>
+            </a:extLst>
+          </a:blip>
+          <a:stretch>
+            <a:fillRect/>
+          </a:stretch>
+        </p:blipFill>
+        <p:spPr>
+          <a:xfrm>
+            <a:off x="5485305" y="2906165"/>
+            <a:ext cx="552152" cy="552152"/>
+          </a:xfrm>
+          <a:prstGeom prst="rect">
+            <a:avLst/>
+          </a:prstGeom>
+        </p:spPr>
+      </p:pic>
+      <p:sp>
+        <p:nvSpPr>
+          <p:cNvPr id="35" name="TextBox 34">
+            <a:extLst>
+              <a:ext uri="{FF2B5EF4-FFF2-40B4-BE49-F238E27FC236}">
+                <a16:creationId xmlns:a16="http://schemas.microsoft.com/office/drawing/2014/main" id="{87635295-EEB1-514E-A56E-7E3082274CEE}"/>
+              </a:ext>
+            </a:extLst>
+          </p:cNvPr>
+          <p:cNvSpPr txBox="1"/>
+          <p:nvPr/>
+        </p:nvSpPr>
+        <p:spPr>
+          <a:xfrm>
+            <a:off x="10257291" y="3432617"/>
+            <a:ext cx="971021" cy="507831"/>
+          </a:xfrm>
+          <a:prstGeom prst="rect">
+            <a:avLst/>
+          </a:prstGeom>
+          <a:noFill/>
+        </p:spPr>
+        <p:txBody>
+          <a:bodyPr wrap="square" rtlCol="0">
+            <a:spAutoFit/>
+          </a:bodyPr>
+          <a:lstStyle/>
+          <a:p>
+            <a:pPr algn="ctr" defTabSz="192828"/>
+            <a:r>
+              <a:rPr lang="en-US" sz="1350" dirty="0">
+                <a:solidFill>
+                  <a:srgbClr val="FFFFFF"/>
+                </a:solidFill>
+                <a:latin typeface="Amazon Ember Light"/>
+              </a:rPr>
+              <a:t>AWS X-Ray</a:t>
+            </a:r>
+          </a:p>
+        </p:txBody>
+      </p:sp>
+      <p:pic>
+        <p:nvPicPr>
+          <p:cNvPr id="36" name="Graphic 35">
+            <a:extLst>
+              <a:ext uri="{FF2B5EF4-FFF2-40B4-BE49-F238E27FC236}">
+                <a16:creationId xmlns:a16="http://schemas.microsoft.com/office/drawing/2014/main" id="{38637B8E-1B10-1C4A-BD58-8427B7D3FB8D}"/>
+              </a:ext>
+            </a:extLst>
+          </p:cNvPr>
+          <p:cNvPicPr>
+            <a:picLocks noChangeAspect="1"/>
+          </p:cNvPicPr>
+          <p:nvPr/>
+        </p:nvPicPr>
+        <p:blipFill>
+          <a:blip r:embed="rId14">
+            <a:extLst>
+              <a:ext uri="{96DAC541-7B7A-43D3-8B79-37D633B846F1}">
+                <asvg:svgBlip xmlns:asvg="http://schemas.microsoft.com/office/drawing/2016/SVG/main" r:embed="rId15"/>
+              </a:ext>
+            </a:extLst>
+          </a:blip>
+          <a:stretch>
+            <a:fillRect/>
+          </a:stretch>
+        </p:blipFill>
+        <p:spPr>
+          <a:xfrm>
+            <a:off x="9540233" y="3240819"/>
+            <a:ext cx="656629" cy="656629"/>
           </a:xfrm>
           <a:prstGeom prst="rect">
             <a:avLst/>
@@ -4289,7 +6201,7 @@
     </p:spTree>
     <p:extLst>
       <p:ext uri="{BB962C8B-B14F-4D97-AF65-F5344CB8AC3E}">
-        <p14:creationId xmlns:p14="http://schemas.microsoft.com/office/powerpoint/2010/main" val="415006633"/>
+        <p14:creationId xmlns:p14="http://schemas.microsoft.com/office/powerpoint/2010/main" val="1849519005"/>
       </p:ext>
     </p:extLst>
   </p:cSld>
@@ -4592,4 +6504,306 @@
     </a:ext>
   </a:extLst>
 </a:theme>
+</file>
+
+<file path=ppt/theme/theme2.xml><?xml version="1.0" encoding="utf-8"?>
+<a:theme xmlns:a="http://schemas.openxmlformats.org/drawingml/2006/main" name="1_4-05665_ReInvent_2018_Template_3x1_Dark">
+  <a:themeElements>
+    <a:clrScheme name="Custom 28">
+      <a:dk1>
+        <a:srgbClr val="000000"/>
+      </a:dk1>
+      <a:lt1>
+        <a:srgbClr val="FFFFFF"/>
+      </a:lt1>
+      <a:dk2>
+        <a:srgbClr val="282828"/>
+      </a:dk2>
+      <a:lt2>
+        <a:srgbClr val="FF2850"/>
+      </a:lt2>
+      <a:accent1>
+        <a:srgbClr val="FF2850"/>
+      </a:accent1>
+      <a:accent2>
+        <a:srgbClr val="000AFF"/>
+      </a:accent2>
+      <a:accent3>
+        <a:srgbClr val="8C28FF"/>
+      </a:accent3>
+      <a:accent4>
+        <a:srgbClr val="D232AA"/>
+      </a:accent4>
+      <a:accent5>
+        <a:srgbClr val="FF9900"/>
+      </a:accent5>
+      <a:accent6>
+        <a:srgbClr val="50AA4B"/>
+      </a:accent6>
+      <a:hlink>
+        <a:srgbClr val="2D64AA"/>
+      </a:hlink>
+      <a:folHlink>
+        <a:srgbClr val="2D64AA"/>
+      </a:folHlink>
+    </a:clrScheme>
+    <a:fontScheme name="Custom 14">
+      <a:majorFont>
+        <a:latin typeface="Amazon Ember Light"/>
+        <a:ea typeface=""/>
+        <a:cs typeface=""/>
+      </a:majorFont>
+      <a:minorFont>
+        <a:latin typeface="Amazon Ember"/>
+        <a:ea typeface=""/>
+        <a:cs typeface=""/>
+      </a:minorFont>
+    </a:fontScheme>
+    <a:fmtScheme name="Couture">
+      <a:fillStyleLst>
+        <a:solidFill>
+          <a:schemeClr val="phClr"/>
+        </a:solidFill>
+        <a:solidFill>
+          <a:schemeClr val="phClr">
+            <a:tint val="65000"/>
+          </a:schemeClr>
+        </a:solidFill>
+        <a:solidFill>
+          <a:schemeClr val="phClr">
+            <a:shade val="80000"/>
+            <a:satMod val="180000"/>
+          </a:schemeClr>
+        </a:solidFill>
+      </a:fillStyleLst>
+      <a:lnStyleLst>
+        <a:ln w="9525" cap="flat" cmpd="sng" algn="ctr">
+          <a:solidFill>
+            <a:schemeClr val="phClr"/>
+          </a:solidFill>
+          <a:prstDash val="solid"/>
+        </a:ln>
+        <a:ln w="10795" cap="flat" cmpd="sng" algn="ctr">
+          <a:solidFill>
+            <a:schemeClr val="phClr"/>
+          </a:solidFill>
+          <a:prstDash val="solid"/>
+        </a:ln>
+        <a:ln w="17145" cap="flat" cmpd="sng" algn="ctr">
+          <a:solidFill>
+            <a:schemeClr val="phClr">
+              <a:shade val="95000"/>
+              <a:alpha val="50000"/>
+              <a:satMod val="150000"/>
+            </a:schemeClr>
+          </a:solidFill>
+          <a:prstDash val="solid"/>
+        </a:ln>
+      </a:lnStyleLst>
+      <a:effectStyleLst>
+        <a:effectStyle>
+          <a:effectLst/>
+        </a:effectStyle>
+        <a:effectStyle>
+          <a:effectLst/>
+        </a:effectStyle>
+        <a:effectStyle>
+          <a:effectLst>
+            <a:outerShdw blurRad="44450" dist="13970" dir="5400000" algn="ctr" rotWithShape="0">
+              <a:srgbClr val="000000">
+                <a:alpha val="45000"/>
+              </a:srgbClr>
+            </a:outerShdw>
+          </a:effectLst>
+          <a:scene3d>
+            <a:camera prst="orthographicFront">
+              <a:rot lat="0" lon="0" rev="0"/>
+            </a:camera>
+            <a:lightRig rig="twoPt" dir="tl"/>
+          </a:scene3d>
+          <a:sp3d prstMaterial="flat">
+            <a:bevelT w="19050" h="31750" prst="coolSlant"/>
+          </a:sp3d>
+        </a:effectStyle>
+      </a:effectStyleLst>
+      <a:bgFillStyleLst>
+        <a:solidFill>
+          <a:schemeClr val="phClr"/>
+        </a:solidFill>
+        <a:gradFill rotWithShape="1">
+          <a:gsLst>
+            <a:gs pos="0">
+              <a:schemeClr val="phClr">
+                <a:tint val="40000"/>
+                <a:satMod val="350000"/>
+              </a:schemeClr>
+            </a:gs>
+            <a:gs pos="40000">
+              <a:schemeClr val="phClr">
+                <a:tint val="45000"/>
+                <a:shade val="99000"/>
+                <a:satMod val="350000"/>
+              </a:schemeClr>
+            </a:gs>
+            <a:gs pos="100000">
+              <a:schemeClr val="phClr">
+                <a:shade val="20000"/>
+                <a:satMod val="255000"/>
+              </a:schemeClr>
+            </a:gs>
+          </a:gsLst>
+          <a:path path="circle">
+            <a:fillToRect l="50000" t="-80000" r="50000" b="180000"/>
+          </a:path>
+        </a:gradFill>
+        <a:gradFill rotWithShape="1">
+          <a:gsLst>
+            <a:gs pos="0">
+              <a:schemeClr val="phClr">
+                <a:tint val="80000"/>
+                <a:satMod val="300000"/>
+              </a:schemeClr>
+            </a:gs>
+            <a:gs pos="100000">
+              <a:schemeClr val="phClr">
+                <a:shade val="30000"/>
+                <a:satMod val="200000"/>
+              </a:schemeClr>
+            </a:gs>
+          </a:gsLst>
+          <a:path path="circle">
+            <a:fillToRect l="50000" t="50000" r="50000" b="50000"/>
+          </a:path>
+        </a:gradFill>
+      </a:bgFillStyleLst>
+    </a:fmtScheme>
+  </a:themeElements>
+  <a:objectDefaults>
+    <a:spDef>
+      <a:spPr bwMode="auto">
+        <a:solidFill>
+          <a:schemeClr val="accent1"/>
+        </a:solidFill>
+        <a:ln>
+          <a:noFill/>
+          <a:headEnd type="none" w="med" len="med"/>
+          <a:tailEnd type="none" w="med" len="med"/>
+        </a:ln>
+        <a:effectLst/>
+      </a:spPr>
+      <a:bodyPr rot="0" spcFirstLastPara="0" vertOverflow="overflow" horzOverflow="overflow" vert="horz" wrap="square" lIns="182880" tIns="146304" rIns="182880" bIns="146304" numCol="1" spcCol="0" rtlCol="0" fromWordArt="0" anchor="ctr" anchorCtr="0" forceAA="0" compatLnSpc="1">
+        <a:prstTxWarp prst="textNoShape">
+          <a:avLst/>
+        </a:prstTxWarp>
+        <a:noAutofit/>
+      </a:bodyPr>
+      <a:lstStyle>
+        <a:defPPr algn="ctr" defTabSz="932472" fontAlgn="base">
+          <a:lnSpc>
+            <a:spcPct val="90000"/>
+          </a:lnSpc>
+          <a:spcBef>
+            <a:spcPct val="0"/>
+          </a:spcBef>
+          <a:spcAft>
+            <a:spcPct val="0"/>
+          </a:spcAft>
+          <a:defRPr sz="6600" dirty="0" smtClean="0">
+            <a:gradFill>
+              <a:gsLst>
+                <a:gs pos="0">
+                  <a:srgbClr val="FFFFFF"/>
+                </a:gs>
+                <a:gs pos="100000">
+                  <a:srgbClr val="FFFFFF"/>
+                </a:gs>
+              </a:gsLst>
+              <a:lin ang="5400000" scaled="0"/>
+            </a:gradFill>
+            <a:ea typeface="Segoe UI" pitchFamily="34" charset="0"/>
+            <a:cs typeface="Segoe UI" pitchFamily="34" charset="0"/>
+          </a:defRPr>
+        </a:defPPr>
+      </a:lstStyle>
+      <a:style>
+        <a:lnRef idx="1">
+          <a:schemeClr val="accent2"/>
+        </a:lnRef>
+        <a:fillRef idx="3">
+          <a:schemeClr val="accent2"/>
+        </a:fillRef>
+        <a:effectRef idx="2">
+          <a:schemeClr val="accent2"/>
+        </a:effectRef>
+        <a:fontRef idx="minor">
+          <a:schemeClr val="lt1"/>
+        </a:fontRef>
+      </a:style>
+    </a:spDef>
+    <a:lnDef>
+      <a:spPr>
+        <a:ln>
+          <a:solidFill>
+            <a:schemeClr val="tx1"/>
+          </a:solidFill>
+          <a:headEnd type="none"/>
+          <a:tailEnd type="none"/>
+        </a:ln>
+      </a:spPr>
+      <a:bodyPr/>
+      <a:lstStyle/>
+      <a:style>
+        <a:lnRef idx="1">
+          <a:schemeClr val="accent1"/>
+        </a:lnRef>
+        <a:fillRef idx="0">
+          <a:schemeClr val="accent1"/>
+        </a:fillRef>
+        <a:effectRef idx="0">
+          <a:schemeClr val="accent1"/>
+        </a:effectRef>
+        <a:fontRef idx="minor">
+          <a:schemeClr val="tx1"/>
+        </a:fontRef>
+      </a:style>
+    </a:lnDef>
+    <a:txDef>
+      <a:spPr>
+        <a:noFill/>
+      </a:spPr>
+      <a:bodyPr wrap="square" lIns="182880" tIns="146304" rIns="182880" bIns="146304" rtlCol="0">
+        <a:spAutoFit/>
+      </a:bodyPr>
+      <a:lstStyle>
+        <a:defPPr>
+          <a:lnSpc>
+            <a:spcPct val="90000"/>
+          </a:lnSpc>
+          <a:spcAft>
+            <a:spcPts val="1800"/>
+          </a:spcAft>
+          <a:defRPr sz="7200" dirty="0" smtClean="0">
+            <a:gradFill>
+              <a:gsLst>
+                <a:gs pos="2917">
+                  <a:schemeClr val="tx1"/>
+                </a:gs>
+                <a:gs pos="30000">
+                  <a:schemeClr val="tx1"/>
+                </a:gs>
+              </a:gsLst>
+              <a:lin ang="5400000" scaled="0"/>
+            </a:gradFill>
+          </a:defRPr>
+        </a:defPPr>
+      </a:lstStyle>
+    </a:txDef>
+  </a:objectDefaults>
+  <a:extraClrSchemeLst/>
+  <a:extLst>
+    <a:ext uri="{05A4C25C-085E-4340-85A3-A5531E510DB2}">
+      <thm15:themeFamily xmlns:thm15="http://schemas.microsoft.com/office/thememl/2012/main" name="Monday Night Madness 2018 template_3x1.potx" id="{CB000EB7-E4BA-4361-88C7-5B61577A6439}" vid="{717864A3-7FAD-492B-8D8A-E25C71039D3D}"/>
+    </a:ext>
+  </a:extLst>
+</a:theme>
 </file>
</xml_diff>